<commit_message>
All likely slides templates
</commit_message>
<xml_diff>
--- a/Final_Presentation.pptx
+++ b/Final_Presentation.pptx
@@ -7,6 +7,13 @@
   <p:sldIdLst>
     <p:sldId id="256" r:id="rId2"/>
     <p:sldId id="257" r:id="rId3"/>
+    <p:sldId id="259" r:id="rId4"/>
+    <p:sldId id="258" r:id="rId5"/>
+    <p:sldId id="261" r:id="rId6"/>
+    <p:sldId id="260" r:id="rId7"/>
+    <p:sldId id="262" r:id="rId8"/>
+    <p:sldId id="263" r:id="rId9"/>
+    <p:sldId id="264" r:id="rId10"/>
   </p:sldIdLst>
   <p:sldSz cx="12192000" cy="6858000"/>
   <p:notesSz cx="6858000" cy="9144000"/>
@@ -113,6 +120,10 @@
 </p:presentation>
 </file>
 
+<file path=ppt/revisionInfo.xml><?xml version="1.0" encoding="utf-8"?>
+<p1510:revInfo xmlns:a="http://schemas.openxmlformats.org/drawingml/2006/main" xmlns:r="http://schemas.openxmlformats.org/officeDocument/2006/relationships" xmlns:p1510="http://schemas.microsoft.com/office/powerpoint/2015/10/main"/>
+</file>
+
 <file path=ppt/slideLayouts/slideLayout1.xml><?xml version="1.0" encoding="utf-8"?>
 <p:sldLayout xmlns:a="http://schemas.openxmlformats.org/drawingml/2006/main" xmlns:r="http://schemas.openxmlformats.org/officeDocument/2006/relationships" xmlns:p="http://schemas.openxmlformats.org/presentationml/2006/main" type="title" preserve="1">
   <p:cSld name="Title Slide">
@@ -157,7 +168,7 @@
           </a:lstStyle>
           <a:p>
             <a:r>
-              <a:rPr lang="en-US" smtClean="0"/>
+              <a:rPr lang="en-US"/>
               <a:t>Click to edit Master title style</a:t>
             </a:r>
             <a:endParaRPr lang="en-US" dirty="0"/>
@@ -228,7 +239,7 @@
           </a:lstStyle>
           <a:p>
             <a:r>
-              <a:rPr lang="en-US" smtClean="0"/>
+              <a:rPr lang="en-US"/>
               <a:t>Click to edit Master subtitle style</a:t>
             </a:r>
             <a:endParaRPr lang="en-US" dirty="0"/>
@@ -252,7 +263,7 @@
           <a:p>
             <a:fld id="{48A87A34-81AB-432B-8DAE-1953F412C126}" type="datetimeFigureOut">
               <a:rPr lang="en-US" dirty="0"/>
-              <a:t>5/9/2018</a:t>
+              <a:t>5/10/2018</a:t>
             </a:fld>
             <a:endParaRPr lang="en-US" dirty="0"/>
           </a:p>
@@ -382,7 +393,7 @@
           <a:lstStyle/>
           <a:p>
             <a:r>
-              <a:rPr lang="en-US" smtClean="0"/>
+              <a:rPr lang="en-US"/>
               <a:t>Click to edit Master title style</a:t>
             </a:r>
             <a:endParaRPr lang="en-US" dirty="0"/>
@@ -406,35 +417,35 @@
           <a:p>
             <a:pPr lvl="0"/>
             <a:r>
-              <a:rPr lang="en-US" smtClean="0"/>
+              <a:rPr lang="en-US"/>
               <a:t>Edit Master text styles</a:t>
             </a:r>
           </a:p>
           <a:p>
             <a:pPr lvl="1"/>
             <a:r>
-              <a:rPr lang="en-US" smtClean="0"/>
+              <a:rPr lang="en-US"/>
               <a:t>Second level</a:t>
             </a:r>
           </a:p>
           <a:p>
             <a:pPr lvl="2"/>
             <a:r>
-              <a:rPr lang="en-US" smtClean="0"/>
+              <a:rPr lang="en-US"/>
               <a:t>Third level</a:t>
             </a:r>
           </a:p>
           <a:p>
             <a:pPr lvl="3"/>
             <a:r>
-              <a:rPr lang="en-US" smtClean="0"/>
+              <a:rPr lang="en-US"/>
               <a:t>Fourth level</a:t>
             </a:r>
           </a:p>
           <a:p>
             <a:pPr lvl="4"/>
             <a:r>
-              <a:rPr lang="en-US" smtClean="0"/>
+              <a:rPr lang="en-US"/>
               <a:t>Fifth level</a:t>
             </a:r>
             <a:endParaRPr lang="en-US" dirty="0"/>
@@ -458,7 +469,7 @@
           <a:p>
             <a:fld id="{48A87A34-81AB-432B-8DAE-1953F412C126}" type="datetimeFigureOut">
               <a:rPr lang="en-US" dirty="0"/>
-              <a:t>5/9/2018</a:t>
+              <a:t>5/10/2018</a:t>
             </a:fld>
             <a:endParaRPr lang="en-US" dirty="0"/>
           </a:p>
@@ -587,7 +598,7 @@
           </a:lstStyle>
           <a:p>
             <a:r>
-              <a:rPr lang="en-US" smtClean="0"/>
+              <a:rPr lang="en-US"/>
               <a:t>Click to edit Master title style</a:t>
             </a:r>
             <a:endParaRPr lang="en-US" dirty="0"/>
@@ -616,35 +627,35 @@
           <a:p>
             <a:pPr lvl="0"/>
             <a:r>
-              <a:rPr lang="en-US" smtClean="0"/>
+              <a:rPr lang="en-US"/>
               <a:t>Edit Master text styles</a:t>
             </a:r>
           </a:p>
           <a:p>
             <a:pPr lvl="1"/>
             <a:r>
-              <a:rPr lang="en-US" smtClean="0"/>
+              <a:rPr lang="en-US"/>
               <a:t>Second level</a:t>
             </a:r>
           </a:p>
           <a:p>
             <a:pPr lvl="2"/>
             <a:r>
-              <a:rPr lang="en-US" smtClean="0"/>
+              <a:rPr lang="en-US"/>
               <a:t>Third level</a:t>
             </a:r>
           </a:p>
           <a:p>
             <a:pPr lvl="3"/>
             <a:r>
-              <a:rPr lang="en-US" smtClean="0"/>
+              <a:rPr lang="en-US"/>
               <a:t>Fourth level</a:t>
             </a:r>
           </a:p>
           <a:p>
             <a:pPr lvl="4"/>
             <a:r>
-              <a:rPr lang="en-US" smtClean="0"/>
+              <a:rPr lang="en-US"/>
               <a:t>Fifth level</a:t>
             </a:r>
             <a:endParaRPr lang="en-US" dirty="0"/>
@@ -668,7 +679,7 @@
           <a:p>
             <a:fld id="{48A87A34-81AB-432B-8DAE-1953F412C126}" type="datetimeFigureOut">
               <a:rPr lang="en-US" dirty="0"/>
-              <a:t>5/9/2018</a:t>
+              <a:t>5/10/2018</a:t>
             </a:fld>
             <a:endParaRPr lang="en-US" dirty="0"/>
           </a:p>
@@ -788,7 +799,7 @@
           <a:lstStyle/>
           <a:p>
             <a:r>
-              <a:rPr lang="en-US" smtClean="0"/>
+              <a:rPr lang="en-US"/>
               <a:t>Click to edit Master title style</a:t>
             </a:r>
             <a:endParaRPr lang="en-US" dirty="0"/>
@@ -812,35 +823,35 @@
           <a:p>
             <a:pPr lvl="0"/>
             <a:r>
-              <a:rPr lang="en-US" smtClean="0"/>
+              <a:rPr lang="en-US"/>
               <a:t>Edit Master text styles</a:t>
             </a:r>
           </a:p>
           <a:p>
             <a:pPr lvl="1"/>
             <a:r>
-              <a:rPr lang="en-US" smtClean="0"/>
+              <a:rPr lang="en-US"/>
               <a:t>Second level</a:t>
             </a:r>
           </a:p>
           <a:p>
             <a:pPr lvl="2"/>
             <a:r>
-              <a:rPr lang="en-US" smtClean="0"/>
+              <a:rPr lang="en-US"/>
               <a:t>Third level</a:t>
             </a:r>
           </a:p>
           <a:p>
             <a:pPr lvl="3"/>
             <a:r>
-              <a:rPr lang="en-US" smtClean="0"/>
+              <a:rPr lang="en-US"/>
               <a:t>Fourth level</a:t>
             </a:r>
           </a:p>
           <a:p>
             <a:pPr lvl="4"/>
             <a:r>
-              <a:rPr lang="en-US" smtClean="0"/>
+              <a:rPr lang="en-US"/>
               <a:t>Fifth level</a:t>
             </a:r>
             <a:endParaRPr lang="en-US" dirty="0"/>
@@ -864,7 +875,7 @@
           <a:p>
             <a:fld id="{48A87A34-81AB-432B-8DAE-1953F412C126}" type="datetimeFigureOut">
               <a:rPr lang="en-US" dirty="0"/>
-              <a:t>5/9/2018</a:t>
+              <a:t>5/10/2018</a:t>
             </a:fld>
             <a:endParaRPr lang="en-US" dirty="0"/>
           </a:p>
@@ -995,7 +1006,7 @@
           </a:lstStyle>
           <a:p>
             <a:r>
-              <a:rPr lang="en-US" smtClean="0"/>
+              <a:rPr lang="en-US"/>
               <a:t>Click to edit Master title style</a:t>
             </a:r>
             <a:endParaRPr lang="en-US" dirty="0"/>
@@ -1115,7 +1126,7 @@
           <a:p>
             <a:pPr lvl="0"/>
             <a:r>
-              <a:rPr lang="en-US" smtClean="0"/>
+              <a:rPr lang="en-US"/>
               <a:t>Edit Master text styles</a:t>
             </a:r>
           </a:p>
@@ -1138,7 +1149,7 @@
           <a:p>
             <a:fld id="{48A87A34-81AB-432B-8DAE-1953F412C126}" type="datetimeFigureOut">
               <a:rPr lang="en-US" dirty="0"/>
-              <a:t>5/9/2018</a:t>
+              <a:t>5/10/2018</a:t>
             </a:fld>
             <a:endParaRPr lang="en-US" dirty="0"/>
           </a:p>
@@ -1263,7 +1274,7 @@
           <a:lstStyle/>
           <a:p>
             <a:r>
-              <a:rPr lang="en-US" smtClean="0"/>
+              <a:rPr lang="en-US"/>
               <a:t>Click to edit Master title style</a:t>
             </a:r>
             <a:endParaRPr lang="en-US" dirty="0"/>
@@ -1292,35 +1303,35 @@
           <a:p>
             <a:pPr lvl="0"/>
             <a:r>
-              <a:rPr lang="en-US" smtClean="0"/>
+              <a:rPr lang="en-US"/>
               <a:t>Edit Master text styles</a:t>
             </a:r>
           </a:p>
           <a:p>
             <a:pPr lvl="1"/>
             <a:r>
-              <a:rPr lang="en-US" smtClean="0"/>
+              <a:rPr lang="en-US"/>
               <a:t>Second level</a:t>
             </a:r>
           </a:p>
           <a:p>
             <a:pPr lvl="2"/>
             <a:r>
-              <a:rPr lang="en-US" smtClean="0"/>
+              <a:rPr lang="en-US"/>
               <a:t>Third level</a:t>
             </a:r>
           </a:p>
           <a:p>
             <a:pPr lvl="3"/>
             <a:r>
-              <a:rPr lang="en-US" smtClean="0"/>
+              <a:rPr lang="en-US"/>
               <a:t>Fourth level</a:t>
             </a:r>
           </a:p>
           <a:p>
             <a:pPr lvl="4"/>
             <a:r>
-              <a:rPr lang="en-US" smtClean="0"/>
+              <a:rPr lang="en-US"/>
               <a:t>Fifth level</a:t>
             </a:r>
             <a:endParaRPr lang="en-US" dirty="0"/>
@@ -1349,35 +1360,35 @@
           <a:p>
             <a:pPr lvl="0"/>
             <a:r>
-              <a:rPr lang="en-US" smtClean="0"/>
+              <a:rPr lang="en-US"/>
               <a:t>Edit Master text styles</a:t>
             </a:r>
           </a:p>
           <a:p>
             <a:pPr lvl="1"/>
             <a:r>
-              <a:rPr lang="en-US" smtClean="0"/>
+              <a:rPr lang="en-US"/>
               <a:t>Second level</a:t>
             </a:r>
           </a:p>
           <a:p>
             <a:pPr lvl="2"/>
             <a:r>
-              <a:rPr lang="en-US" smtClean="0"/>
+              <a:rPr lang="en-US"/>
               <a:t>Third level</a:t>
             </a:r>
           </a:p>
           <a:p>
             <a:pPr lvl="3"/>
             <a:r>
-              <a:rPr lang="en-US" smtClean="0"/>
+              <a:rPr lang="en-US"/>
               <a:t>Fourth level</a:t>
             </a:r>
           </a:p>
           <a:p>
             <a:pPr lvl="4"/>
             <a:r>
-              <a:rPr lang="en-US" smtClean="0"/>
+              <a:rPr lang="en-US"/>
               <a:t>Fifth level</a:t>
             </a:r>
             <a:endParaRPr lang="en-US" dirty="0"/>
@@ -1401,7 +1412,7 @@
           <a:p>
             <a:fld id="{48A87A34-81AB-432B-8DAE-1953F412C126}" type="datetimeFigureOut">
               <a:rPr lang="en-US" dirty="0"/>
-              <a:t>5/9/2018</a:t>
+              <a:t>5/10/2018</a:t>
             </a:fld>
             <a:endParaRPr lang="en-US" dirty="0"/>
           </a:p>
@@ -1526,7 +1537,7 @@
           <a:lstStyle/>
           <a:p>
             <a:r>
-              <a:rPr lang="en-US" smtClean="0"/>
+              <a:rPr lang="en-US"/>
               <a:t>Click to edit Master title style</a:t>
             </a:r>
             <a:endParaRPr lang="en-US" dirty="0"/>
@@ -1601,7 +1612,7 @@
           <a:p>
             <a:pPr lvl="0"/>
             <a:r>
-              <a:rPr lang="en-US" smtClean="0"/>
+              <a:rPr lang="en-US"/>
               <a:t>Edit Master text styles</a:t>
             </a:r>
           </a:p>
@@ -1629,35 +1640,35 @@
           <a:p>
             <a:pPr lvl="0"/>
             <a:r>
-              <a:rPr lang="en-US" smtClean="0"/>
+              <a:rPr lang="en-US"/>
               <a:t>Edit Master text styles</a:t>
             </a:r>
           </a:p>
           <a:p>
             <a:pPr lvl="1"/>
             <a:r>
-              <a:rPr lang="en-US" smtClean="0"/>
+              <a:rPr lang="en-US"/>
               <a:t>Second level</a:t>
             </a:r>
           </a:p>
           <a:p>
             <a:pPr lvl="2"/>
             <a:r>
-              <a:rPr lang="en-US" smtClean="0"/>
+              <a:rPr lang="en-US"/>
               <a:t>Third level</a:t>
             </a:r>
           </a:p>
           <a:p>
             <a:pPr lvl="3"/>
             <a:r>
-              <a:rPr lang="en-US" smtClean="0"/>
+              <a:rPr lang="en-US"/>
               <a:t>Fourth level</a:t>
             </a:r>
           </a:p>
           <a:p>
             <a:pPr lvl="4"/>
             <a:r>
-              <a:rPr lang="en-US" smtClean="0"/>
+              <a:rPr lang="en-US"/>
               <a:t>Fifth level</a:t>
             </a:r>
             <a:endParaRPr lang="en-US" dirty="0"/>
@@ -1732,7 +1743,7 @@
           <a:p>
             <a:pPr lvl="0"/>
             <a:r>
-              <a:rPr lang="en-US" smtClean="0"/>
+              <a:rPr lang="en-US"/>
               <a:t>Edit Master text styles</a:t>
             </a:r>
           </a:p>
@@ -1760,35 +1771,35 @@
           <a:p>
             <a:pPr lvl="0"/>
             <a:r>
-              <a:rPr lang="en-US" smtClean="0"/>
+              <a:rPr lang="en-US"/>
               <a:t>Edit Master text styles</a:t>
             </a:r>
           </a:p>
           <a:p>
             <a:pPr lvl="1"/>
             <a:r>
-              <a:rPr lang="en-US" smtClean="0"/>
+              <a:rPr lang="en-US"/>
               <a:t>Second level</a:t>
             </a:r>
           </a:p>
           <a:p>
             <a:pPr lvl="2"/>
             <a:r>
-              <a:rPr lang="en-US" smtClean="0"/>
+              <a:rPr lang="en-US"/>
               <a:t>Third level</a:t>
             </a:r>
           </a:p>
           <a:p>
             <a:pPr lvl="3"/>
             <a:r>
-              <a:rPr lang="en-US" smtClean="0"/>
+              <a:rPr lang="en-US"/>
               <a:t>Fourth level</a:t>
             </a:r>
           </a:p>
           <a:p>
             <a:pPr lvl="4"/>
             <a:r>
-              <a:rPr lang="en-US" smtClean="0"/>
+              <a:rPr lang="en-US"/>
               <a:t>Fifth level</a:t>
             </a:r>
             <a:endParaRPr lang="en-US" dirty="0"/>
@@ -1812,7 +1823,7 @@
           <a:p>
             <a:fld id="{48A87A34-81AB-432B-8DAE-1953F412C126}" type="datetimeFigureOut">
               <a:rPr lang="en-US" dirty="0"/>
-              <a:t>5/9/2018</a:t>
+              <a:t>5/10/2018</a:t>
             </a:fld>
             <a:endParaRPr lang="en-US" dirty="0"/>
           </a:p>
@@ -1932,7 +1943,7 @@
           <a:lstStyle/>
           <a:p>
             <a:r>
-              <a:rPr lang="en-US" smtClean="0"/>
+              <a:rPr lang="en-US"/>
               <a:t>Click to edit Master title style</a:t>
             </a:r>
             <a:endParaRPr lang="en-US" dirty="0"/>
@@ -1956,7 +1967,7 @@
           <a:p>
             <a:fld id="{48A87A34-81AB-432B-8DAE-1953F412C126}" type="datetimeFigureOut">
               <a:rPr lang="en-US" dirty="0"/>
-              <a:t>5/9/2018</a:t>
+              <a:t>5/10/2018</a:t>
             </a:fld>
             <a:endParaRPr lang="en-US" dirty="0"/>
           </a:p>
@@ -2077,7 +2088,7 @@
           <a:p>
             <a:fld id="{48A87A34-81AB-432B-8DAE-1953F412C126}" type="datetimeFigureOut">
               <a:rPr lang="en-US" dirty="0"/>
-              <a:t>5/9/2018</a:t>
+              <a:t>5/10/2018</a:t>
             </a:fld>
             <a:endParaRPr lang="en-US" dirty="0"/>
           </a:p>
@@ -2177,7 +2188,7 @@
           </a:lstStyle>
           <a:p>
             <a:r>
-              <a:rPr lang="en-US" smtClean="0"/>
+              <a:rPr lang="en-US"/>
               <a:t>Click to edit Master title style</a:t>
             </a:r>
             <a:endParaRPr lang="en-US" dirty="0"/>
@@ -2206,35 +2217,35 @@
           <a:p>
             <a:pPr lvl="0"/>
             <a:r>
-              <a:rPr lang="en-US" smtClean="0"/>
+              <a:rPr lang="en-US"/>
               <a:t>Edit Master text styles</a:t>
             </a:r>
           </a:p>
           <a:p>
             <a:pPr lvl="1"/>
             <a:r>
-              <a:rPr lang="en-US" smtClean="0"/>
+              <a:rPr lang="en-US"/>
               <a:t>Second level</a:t>
             </a:r>
           </a:p>
           <a:p>
             <a:pPr lvl="2"/>
             <a:r>
-              <a:rPr lang="en-US" smtClean="0"/>
+              <a:rPr lang="en-US"/>
               <a:t>Third level</a:t>
             </a:r>
           </a:p>
           <a:p>
             <a:pPr lvl="3"/>
             <a:r>
-              <a:rPr lang="en-US" smtClean="0"/>
+              <a:rPr lang="en-US"/>
               <a:t>Fourth level</a:t>
             </a:r>
           </a:p>
           <a:p>
             <a:pPr lvl="4"/>
             <a:r>
-              <a:rPr lang="en-US" smtClean="0"/>
+              <a:rPr lang="en-US"/>
               <a:t>Fifth level</a:t>
             </a:r>
             <a:endParaRPr lang="en-US" dirty="0"/>
@@ -2300,7 +2311,7 @@
           <a:p>
             <a:pPr lvl="0"/>
             <a:r>
-              <a:rPr lang="en-US" smtClean="0"/>
+              <a:rPr lang="en-US"/>
               <a:t>Edit Master text styles</a:t>
             </a:r>
           </a:p>
@@ -2323,7 +2334,7 @@
           <a:p>
             <a:fld id="{48A87A34-81AB-432B-8DAE-1953F412C126}" type="datetimeFigureOut">
               <a:rPr lang="en-US" dirty="0"/>
-              <a:t>5/9/2018</a:t>
+              <a:t>5/10/2018</a:t>
             </a:fld>
             <a:endParaRPr lang="en-US" dirty="0"/>
           </a:p>
@@ -2588,7 +2599,7 @@
           </a:lstStyle>
           <a:p>
             <a:r>
-              <a:rPr lang="en-US" smtClean="0"/>
+              <a:rPr lang="en-US"/>
               <a:t>Click to edit Master title style</a:t>
             </a:r>
             <a:endParaRPr lang="en-US" dirty="0"/>
@@ -2663,7 +2674,7 @@
           </a:lstStyle>
           <a:p>
             <a:r>
-              <a:rPr lang="en-US" smtClean="0"/>
+              <a:rPr lang="en-US"/>
               <a:t>Click icon to add picture</a:t>
             </a:r>
             <a:endParaRPr lang="en-US" dirty="0"/>
@@ -2731,7 +2742,7 @@
           <a:p>
             <a:pPr lvl="0"/>
             <a:r>
-              <a:rPr lang="en-US" smtClean="0"/>
+              <a:rPr lang="en-US"/>
               <a:t>Edit Master text styles</a:t>
             </a:r>
           </a:p>
@@ -2764,7 +2775,7 @@
             <a:fld id="{48A87A34-81AB-432B-8DAE-1953F412C126}" type="datetimeFigureOut">
               <a:rPr lang="en-US" dirty="0"/>
               <a:pPr/>
-              <a:t>5/9/2018</a:t>
+              <a:t>5/10/2018</a:t>
             </a:fld>
             <a:endParaRPr lang="en-US" dirty="0"/>
           </a:p>
@@ -2982,7 +2993,7 @@
           <a:lstStyle/>
           <a:p>
             <a:r>
-              <a:rPr lang="en-US" smtClean="0"/>
+              <a:rPr lang="en-US"/>
               <a:t>Click to edit Master title style</a:t>
             </a:r>
             <a:endParaRPr lang="en-US" dirty="0"/>
@@ -3086,7 +3097,7 @@
             <a:fld id="{48A87A34-81AB-432B-8DAE-1953F412C126}" type="datetimeFigureOut">
               <a:rPr lang="en-US" dirty="0"/>
               <a:pPr/>
-              <a:t>5/9/2018</a:t>
+              <a:t>5/10/2018</a:t>
             </a:fld>
             <a:endParaRPr lang="en-US" dirty="0"/>
           </a:p>
@@ -3602,7 +3613,6 @@
               <a:rPr lang="en-US" sz="4400" dirty="0"/>
               <a:t> </a:t>
             </a:r>
-            <a:endParaRPr lang="en-US" sz="4400" dirty="0"/>
           </a:p>
         </p:txBody>
       </p:sp>
@@ -3663,13 +3673,6 @@
               </a:rPr>
               <a:t>Nyaundi</a:t>
             </a:r>
-            <a:r>
-              <a:rPr lang="en-US" sz="2800" dirty="0">
-                <a:latin typeface="Calibri" panose="020F0502020204030204" pitchFamily="34" charset="0"/>
-                <a:cs typeface="Calibri" panose="020F0502020204030204" pitchFamily="34" charset="0"/>
-              </a:rPr>
-              <a:t/>
-            </a:r>
             <a:br>
               <a:rPr lang="en-US" sz="2800" dirty="0">
                 <a:latin typeface="Calibri" panose="020F0502020204030204" pitchFamily="34" charset="0"/>
@@ -3690,13 +3693,6 @@
               </a:rPr>
               <a:t>Ndenge</a:t>
             </a:r>
-            <a:r>
-              <a:rPr lang="en-US" sz="2800" dirty="0">
-                <a:latin typeface="Calibri" panose="020F0502020204030204" pitchFamily="34" charset="0"/>
-                <a:cs typeface="Calibri" panose="020F0502020204030204" pitchFamily="34" charset="0"/>
-              </a:rPr>
-              <a:t/>
-            </a:r>
             <a:br>
               <a:rPr lang="en-US" sz="2800" dirty="0">
                 <a:latin typeface="Calibri" panose="020F0502020204030204" pitchFamily="34" charset="0"/>
@@ -3736,10 +3732,6 @@
                 <a:cs typeface="Calibri" panose="020F0502020204030204" pitchFamily="34" charset="0"/>
               </a:rPr>
               <a:t>Shes</a:t>
-            </a:r>
-            <a:r>
-              <a:rPr lang="en-US" sz="2800" dirty="0"/>
-              <a:t/>
             </a:r>
             <a:br>
               <a:rPr lang="en-US" sz="2800" dirty="0"/>
@@ -3780,140 +3772,882 @@
       </p:grpSpPr>
       <p:sp>
         <p:nvSpPr>
-          <p:cNvPr id="2" name="Title 1"/>
-          <p:cNvSpPr>
-            <a:spLocks noGrp="1"/>
-          </p:cNvSpPr>
-          <p:nvPr>
-            <p:ph type="ctrTitle"/>
-          </p:nvPr>
-        </p:nvSpPr>
-        <p:spPr>
-          <a:xfrm>
-            <a:off x="1277655" y="226099"/>
-            <a:ext cx="9852353" cy="5886601"/>
-          </a:xfrm>
-        </p:spPr>
-        <p:txBody>
-          <a:bodyPr anchor="t">
-            <a:normAutofit/>
-          </a:bodyPr>
+          <p:cNvPr id="2" name="Title 1">
+            <a:extLst>
+              <a:ext uri="{FF2B5EF4-FFF2-40B4-BE49-F238E27FC236}">
+                <a16:creationId xmlns:a16="http://schemas.microsoft.com/office/drawing/2014/main" id="{CF9DDB5E-69C6-4B2C-81A6-433435B9327A}"/>
+              </a:ext>
+            </a:extLst>
+          </p:cNvPr>
+          <p:cNvSpPr>
+            <a:spLocks noGrp="1"/>
+          </p:cNvSpPr>
+          <p:nvPr>
+            <p:ph type="title"/>
+          </p:nvPr>
+        </p:nvSpPr>
+        <p:spPr/>
+        <p:txBody>
+          <a:bodyPr/>
           <a:lstStyle/>
           <a:p>
             <a:pPr algn="ctr"/>
             <a:r>
-              <a:rPr lang="en-US" sz="3200" b="1" dirty="0" smtClean="0">
+              <a:rPr lang="en-US" b="1" dirty="0">
                 <a:latin typeface="Calibri" panose="020F0502020204030204" pitchFamily="34" charset="0"/>
                 <a:cs typeface="Calibri" panose="020F0502020204030204" pitchFamily="34" charset="0"/>
               </a:rPr>
-              <a:t>Presented</a:t>
-            </a:r>
-            <a:r>
-              <a:rPr lang="en-US" sz="4400" dirty="0" smtClean="0">
+              <a:t>overview</a:t>
+            </a:r>
+          </a:p>
+        </p:txBody>
+      </p:sp>
+      <p:sp>
+        <p:nvSpPr>
+          <p:cNvPr id="3" name="Text Placeholder 2">
+            <a:extLst>
+              <a:ext uri="{FF2B5EF4-FFF2-40B4-BE49-F238E27FC236}">
+                <a16:creationId xmlns:a16="http://schemas.microsoft.com/office/drawing/2014/main" id="{A3822016-9C30-4391-BE4C-9BFB06C829AC}"/>
+              </a:ext>
+            </a:extLst>
+          </p:cNvPr>
+          <p:cNvSpPr>
+            <a:spLocks noGrp="1"/>
+          </p:cNvSpPr>
+          <p:nvPr>
+            <p:ph type="body" idx="1"/>
+          </p:nvPr>
+        </p:nvSpPr>
+        <p:spPr/>
+        <p:txBody>
+          <a:bodyPr/>
+          <a:lstStyle/>
+          <a:p>
+            <a:endParaRPr lang="en-US" dirty="0"/>
+          </a:p>
+        </p:txBody>
+      </p:sp>
+      <p:sp>
+        <p:nvSpPr>
+          <p:cNvPr id="4" name="Content Placeholder 3">
+            <a:extLst>
+              <a:ext uri="{FF2B5EF4-FFF2-40B4-BE49-F238E27FC236}">
+                <a16:creationId xmlns:a16="http://schemas.microsoft.com/office/drawing/2014/main" id="{158768A3-92F2-4B2C-81DB-397ACB781B7C}"/>
+              </a:ext>
+            </a:extLst>
+          </p:cNvPr>
+          <p:cNvSpPr>
+            <a:spLocks noGrp="1"/>
+          </p:cNvSpPr>
+          <p:nvPr>
+            <p:ph sz="half" idx="2"/>
+          </p:nvPr>
+        </p:nvSpPr>
+        <p:spPr/>
+        <p:txBody>
+          <a:bodyPr/>
+          <a:lstStyle/>
+          <a:p>
+            <a:endParaRPr lang="en-US"/>
+          </a:p>
+        </p:txBody>
+      </p:sp>
+      <p:sp>
+        <p:nvSpPr>
+          <p:cNvPr id="5" name="Text Placeholder 4">
+            <a:extLst>
+              <a:ext uri="{FF2B5EF4-FFF2-40B4-BE49-F238E27FC236}">
+                <a16:creationId xmlns:a16="http://schemas.microsoft.com/office/drawing/2014/main" id="{0C956753-BD80-4F51-A84D-BF26E725BC27}"/>
+              </a:ext>
+            </a:extLst>
+          </p:cNvPr>
+          <p:cNvSpPr>
+            <a:spLocks noGrp="1"/>
+          </p:cNvSpPr>
+          <p:nvPr>
+            <p:ph type="body" sz="quarter" idx="3"/>
+          </p:nvPr>
+        </p:nvSpPr>
+        <p:spPr/>
+        <p:txBody>
+          <a:bodyPr/>
+          <a:lstStyle/>
+          <a:p>
+            <a:endParaRPr lang="en-US" dirty="0"/>
+          </a:p>
+        </p:txBody>
+      </p:sp>
+      <p:sp>
+        <p:nvSpPr>
+          <p:cNvPr id="6" name="Content Placeholder 5">
+            <a:extLst>
+              <a:ext uri="{FF2B5EF4-FFF2-40B4-BE49-F238E27FC236}">
+                <a16:creationId xmlns:a16="http://schemas.microsoft.com/office/drawing/2014/main" id="{AC7C9880-8263-491D-A83E-0B934E6881C1}"/>
+              </a:ext>
+            </a:extLst>
+          </p:cNvPr>
+          <p:cNvSpPr>
+            <a:spLocks noGrp="1"/>
+          </p:cNvSpPr>
+          <p:nvPr>
+            <p:ph sz="quarter" idx="4"/>
+          </p:nvPr>
+        </p:nvSpPr>
+        <p:spPr/>
+        <p:txBody>
+          <a:bodyPr/>
+          <a:lstStyle/>
+          <a:p>
+            <a:endParaRPr lang="en-US"/>
+          </a:p>
+        </p:txBody>
+      </p:sp>
+    </p:spTree>
+    <p:extLst>
+      <p:ext uri="{BB962C8B-B14F-4D97-AF65-F5344CB8AC3E}">
+        <p14:creationId xmlns:p14="http://schemas.microsoft.com/office/powerpoint/2010/main" val="2536095298"/>
+      </p:ext>
+    </p:extLst>
+  </p:cSld>
+  <p:clrMapOvr>
+    <a:masterClrMapping/>
+  </p:clrMapOvr>
+</p:sld>
+</file>
+
+<file path=ppt/slides/slide3.xml><?xml version="1.0" encoding="utf-8"?>
+<p:sld xmlns:a="http://schemas.openxmlformats.org/drawingml/2006/main" xmlns:r="http://schemas.openxmlformats.org/officeDocument/2006/relationships" xmlns:p="http://schemas.openxmlformats.org/presentationml/2006/main">
+  <p:cSld>
+    <p:spTree>
+      <p:nvGrpSpPr>
+        <p:cNvPr id="1" name=""/>
+        <p:cNvGrpSpPr/>
+        <p:nvPr/>
+      </p:nvGrpSpPr>
+      <p:grpSpPr>
+        <a:xfrm>
+          <a:off x="0" y="0"/>
+          <a:ext cx="0" cy="0"/>
+          <a:chOff x="0" y="0"/>
+          <a:chExt cx="0" cy="0"/>
+        </a:xfrm>
+      </p:grpSpPr>
+      <p:sp>
+        <p:nvSpPr>
+          <p:cNvPr id="2" name="Title 1">
+            <a:extLst>
+              <a:ext uri="{FF2B5EF4-FFF2-40B4-BE49-F238E27FC236}">
+                <a16:creationId xmlns:a16="http://schemas.microsoft.com/office/drawing/2014/main" id="{DD03F5F9-8AE9-45CC-BEC8-122C72924DA9}"/>
+              </a:ext>
+            </a:extLst>
+          </p:cNvPr>
+          <p:cNvSpPr>
+            <a:spLocks noGrp="1"/>
+          </p:cNvSpPr>
+          <p:nvPr>
+            <p:ph type="title"/>
+          </p:nvPr>
+        </p:nvSpPr>
+        <p:spPr/>
+        <p:txBody>
+          <a:bodyPr/>
+          <a:lstStyle/>
+          <a:p>
+            <a:pPr algn="ctr"/>
+            <a:r>
+              <a:rPr lang="en-US" b="1" dirty="0">
                 <a:latin typeface="Calibri" panose="020F0502020204030204" pitchFamily="34" charset="0"/>
                 <a:cs typeface="Calibri" panose="020F0502020204030204" pitchFamily="34" charset="0"/>
               </a:rPr>
-              <a:t> </a:t>
-            </a:r>
-            <a:br>
-              <a:rPr lang="en-US" sz="4400" dirty="0" smtClean="0">
+              <a:t>Brief definition of Unified Process</a:t>
+            </a:r>
+          </a:p>
+        </p:txBody>
+      </p:sp>
+      <p:sp>
+        <p:nvSpPr>
+          <p:cNvPr id="3" name="Content Placeholder 2">
+            <a:extLst>
+              <a:ext uri="{FF2B5EF4-FFF2-40B4-BE49-F238E27FC236}">
+                <a16:creationId xmlns:a16="http://schemas.microsoft.com/office/drawing/2014/main" id="{2EEFF8C4-13AC-43B0-82D5-01E41A56059E}"/>
+              </a:ext>
+            </a:extLst>
+          </p:cNvPr>
+          <p:cNvSpPr>
+            <a:spLocks noGrp="1"/>
+          </p:cNvSpPr>
+          <p:nvPr>
+            <p:ph idx="1"/>
+          </p:nvPr>
+        </p:nvSpPr>
+        <p:spPr/>
+        <p:txBody>
+          <a:bodyPr/>
+          <a:lstStyle/>
+          <a:p>
+            <a:endParaRPr lang="en-US" dirty="0"/>
+          </a:p>
+        </p:txBody>
+      </p:sp>
+    </p:spTree>
+    <p:extLst>
+      <p:ext uri="{BB962C8B-B14F-4D97-AF65-F5344CB8AC3E}">
+        <p14:creationId xmlns:p14="http://schemas.microsoft.com/office/powerpoint/2010/main" val="939974827"/>
+      </p:ext>
+    </p:extLst>
+  </p:cSld>
+  <p:clrMapOvr>
+    <a:masterClrMapping/>
+  </p:clrMapOvr>
+</p:sld>
+</file>
+
+<file path=ppt/slides/slide4.xml><?xml version="1.0" encoding="utf-8"?>
+<p:sld xmlns:a="http://schemas.openxmlformats.org/drawingml/2006/main" xmlns:r="http://schemas.openxmlformats.org/officeDocument/2006/relationships" xmlns:p="http://schemas.openxmlformats.org/presentationml/2006/main">
+  <p:cSld>
+    <p:spTree>
+      <p:nvGrpSpPr>
+        <p:cNvPr id="1" name=""/>
+        <p:cNvGrpSpPr/>
+        <p:nvPr/>
+      </p:nvGrpSpPr>
+      <p:grpSpPr>
+        <a:xfrm>
+          <a:off x="0" y="0"/>
+          <a:ext cx="0" cy="0"/>
+          <a:chOff x="0" y="0"/>
+          <a:chExt cx="0" cy="0"/>
+        </a:xfrm>
+      </p:grpSpPr>
+      <p:sp>
+        <p:nvSpPr>
+          <p:cNvPr id="2" name="Title 1">
+            <a:extLst>
+              <a:ext uri="{FF2B5EF4-FFF2-40B4-BE49-F238E27FC236}">
+                <a16:creationId xmlns:a16="http://schemas.microsoft.com/office/drawing/2014/main" id="{438099E4-6D33-4F30-A43E-55ED91E1D623}"/>
+              </a:ext>
+            </a:extLst>
+          </p:cNvPr>
+          <p:cNvSpPr>
+            <a:spLocks noGrp="1"/>
+          </p:cNvSpPr>
+          <p:nvPr>
+            <p:ph type="title"/>
+          </p:nvPr>
+        </p:nvSpPr>
+        <p:spPr/>
+        <p:txBody>
+          <a:bodyPr/>
+          <a:lstStyle/>
+          <a:p>
+            <a:pPr algn="ctr"/>
+            <a:r>
+              <a:rPr lang="en-US" b="1" dirty="0">
                 <a:latin typeface="Calibri" panose="020F0502020204030204" pitchFamily="34" charset="0"/>
                 <a:cs typeface="Calibri" panose="020F0502020204030204" pitchFamily="34" charset="0"/>
               </a:rPr>
-            </a:br>
-            <a:r>
-              <a:rPr lang="en-US" sz="2400" dirty="0" smtClean="0">
+              <a:t>Central Use case 1</a:t>
+            </a:r>
+          </a:p>
+        </p:txBody>
+      </p:sp>
+      <p:sp>
+        <p:nvSpPr>
+          <p:cNvPr id="3" name="Content Placeholder 2">
+            <a:extLst>
+              <a:ext uri="{FF2B5EF4-FFF2-40B4-BE49-F238E27FC236}">
+                <a16:creationId xmlns:a16="http://schemas.microsoft.com/office/drawing/2014/main" id="{977B9898-47C2-40D3-A08D-837CFDB57D26}"/>
+              </a:ext>
+            </a:extLst>
+          </p:cNvPr>
+          <p:cNvSpPr>
+            <a:spLocks noGrp="1"/>
+          </p:cNvSpPr>
+          <p:nvPr>
+            <p:ph sz="half" idx="1"/>
+          </p:nvPr>
+        </p:nvSpPr>
+        <p:spPr/>
+        <p:txBody>
+          <a:bodyPr/>
+          <a:lstStyle/>
+          <a:p>
+            <a:endParaRPr lang="en-US"/>
+          </a:p>
+        </p:txBody>
+      </p:sp>
+      <p:sp>
+        <p:nvSpPr>
+          <p:cNvPr id="4" name="Content Placeholder 3">
+            <a:extLst>
+              <a:ext uri="{FF2B5EF4-FFF2-40B4-BE49-F238E27FC236}">
+                <a16:creationId xmlns:a16="http://schemas.microsoft.com/office/drawing/2014/main" id="{BED3BABA-D58F-4511-9BCF-FD84EEB6AB0C}"/>
+              </a:ext>
+            </a:extLst>
+          </p:cNvPr>
+          <p:cNvSpPr>
+            <a:spLocks noGrp="1"/>
+          </p:cNvSpPr>
+          <p:nvPr>
+            <p:ph sz="half" idx="2"/>
+          </p:nvPr>
+        </p:nvSpPr>
+        <p:spPr/>
+        <p:txBody>
+          <a:bodyPr/>
+          <a:lstStyle/>
+          <a:p>
+            <a:endParaRPr lang="en-US"/>
+          </a:p>
+        </p:txBody>
+      </p:sp>
+    </p:spTree>
+    <p:extLst>
+      <p:ext uri="{BB962C8B-B14F-4D97-AF65-F5344CB8AC3E}">
+        <p14:creationId xmlns:p14="http://schemas.microsoft.com/office/powerpoint/2010/main" val="977325495"/>
+      </p:ext>
+    </p:extLst>
+  </p:cSld>
+  <p:clrMapOvr>
+    <a:masterClrMapping/>
+  </p:clrMapOvr>
+</p:sld>
+</file>
+
+<file path=ppt/slides/slide5.xml><?xml version="1.0" encoding="utf-8"?>
+<p:sld xmlns:a="http://schemas.openxmlformats.org/drawingml/2006/main" xmlns:r="http://schemas.openxmlformats.org/officeDocument/2006/relationships" xmlns:p="http://schemas.openxmlformats.org/presentationml/2006/main">
+  <p:cSld>
+    <p:spTree>
+      <p:nvGrpSpPr>
+        <p:cNvPr id="1" name=""/>
+        <p:cNvGrpSpPr/>
+        <p:nvPr/>
+      </p:nvGrpSpPr>
+      <p:grpSpPr>
+        <a:xfrm>
+          <a:off x="0" y="0"/>
+          <a:ext cx="0" cy="0"/>
+          <a:chOff x="0" y="0"/>
+          <a:chExt cx="0" cy="0"/>
+        </a:xfrm>
+      </p:grpSpPr>
+      <p:sp>
+        <p:nvSpPr>
+          <p:cNvPr id="2" name="Title 1">
+            <a:extLst>
+              <a:ext uri="{FF2B5EF4-FFF2-40B4-BE49-F238E27FC236}">
+                <a16:creationId xmlns:a16="http://schemas.microsoft.com/office/drawing/2014/main" id="{2E38AF38-5AC7-4CFA-8ADB-0607A519C6AB}"/>
+              </a:ext>
+            </a:extLst>
+          </p:cNvPr>
+          <p:cNvSpPr>
+            <a:spLocks noGrp="1"/>
+          </p:cNvSpPr>
+          <p:nvPr>
+            <p:ph type="title"/>
+          </p:nvPr>
+        </p:nvSpPr>
+        <p:spPr/>
+        <p:txBody>
+          <a:bodyPr/>
+          <a:lstStyle/>
+          <a:p>
+            <a:pPr algn="ctr"/>
+            <a:r>
+              <a:rPr lang="en-US" b="1" dirty="0">
                 <a:latin typeface="Calibri" panose="020F0502020204030204" pitchFamily="34" charset="0"/>
                 <a:cs typeface="Calibri" panose="020F0502020204030204" pitchFamily="34" charset="0"/>
               </a:rPr>
-              <a:t>by</a:t>
-            </a:r>
-            <a:r>
-              <a:rPr lang="en-US" sz="4400" dirty="0" smtClean="0">
+              <a:t>Central Use case 1</a:t>
+            </a:r>
+            <a:endParaRPr lang="en-US" dirty="0"/>
+          </a:p>
+        </p:txBody>
+      </p:sp>
+      <p:sp>
+        <p:nvSpPr>
+          <p:cNvPr id="3" name="Content Placeholder 2">
+            <a:extLst>
+              <a:ext uri="{FF2B5EF4-FFF2-40B4-BE49-F238E27FC236}">
+                <a16:creationId xmlns:a16="http://schemas.microsoft.com/office/drawing/2014/main" id="{4F1639CC-5566-4F0E-893A-758DDFCE7C01}"/>
+              </a:ext>
+            </a:extLst>
+          </p:cNvPr>
+          <p:cNvSpPr>
+            <a:spLocks noGrp="1"/>
+          </p:cNvSpPr>
+          <p:nvPr>
+            <p:ph sz="half" idx="1"/>
+          </p:nvPr>
+        </p:nvSpPr>
+        <p:spPr/>
+        <p:txBody>
+          <a:bodyPr/>
+          <a:lstStyle/>
+          <a:p>
+            <a:endParaRPr lang="en-US"/>
+          </a:p>
+        </p:txBody>
+      </p:sp>
+      <p:sp>
+        <p:nvSpPr>
+          <p:cNvPr id="4" name="Content Placeholder 3">
+            <a:extLst>
+              <a:ext uri="{FF2B5EF4-FFF2-40B4-BE49-F238E27FC236}">
+                <a16:creationId xmlns:a16="http://schemas.microsoft.com/office/drawing/2014/main" id="{3BD21213-64B4-48BA-A5A3-A6C850D71D30}"/>
+              </a:ext>
+            </a:extLst>
+          </p:cNvPr>
+          <p:cNvSpPr>
+            <a:spLocks noGrp="1"/>
+          </p:cNvSpPr>
+          <p:nvPr>
+            <p:ph sz="half" idx="2"/>
+          </p:nvPr>
+        </p:nvSpPr>
+        <p:spPr/>
+        <p:txBody>
+          <a:bodyPr/>
+          <a:lstStyle/>
+          <a:p>
+            <a:endParaRPr lang="en-US"/>
+          </a:p>
+        </p:txBody>
+      </p:sp>
+    </p:spTree>
+    <p:extLst>
+      <p:ext uri="{BB962C8B-B14F-4D97-AF65-F5344CB8AC3E}">
+        <p14:creationId xmlns:p14="http://schemas.microsoft.com/office/powerpoint/2010/main" val="4216272235"/>
+      </p:ext>
+    </p:extLst>
+  </p:cSld>
+  <p:clrMapOvr>
+    <a:masterClrMapping/>
+  </p:clrMapOvr>
+</p:sld>
+</file>
+
+<file path=ppt/slides/slide6.xml><?xml version="1.0" encoding="utf-8"?>
+<p:sld xmlns:a="http://schemas.openxmlformats.org/drawingml/2006/main" xmlns:r="http://schemas.openxmlformats.org/officeDocument/2006/relationships" xmlns:p="http://schemas.openxmlformats.org/presentationml/2006/main">
+  <p:cSld>
+    <p:spTree>
+      <p:nvGrpSpPr>
+        <p:cNvPr id="1" name=""/>
+        <p:cNvGrpSpPr/>
+        <p:nvPr/>
+      </p:nvGrpSpPr>
+      <p:grpSpPr>
+        <a:xfrm>
+          <a:off x="0" y="0"/>
+          <a:ext cx="0" cy="0"/>
+          <a:chOff x="0" y="0"/>
+          <a:chExt cx="0" cy="0"/>
+        </a:xfrm>
+      </p:grpSpPr>
+      <p:sp>
+        <p:nvSpPr>
+          <p:cNvPr id="2" name="Title 1">
+            <a:extLst>
+              <a:ext uri="{FF2B5EF4-FFF2-40B4-BE49-F238E27FC236}">
+                <a16:creationId xmlns:a16="http://schemas.microsoft.com/office/drawing/2014/main" id="{ED8B118C-ED4D-45CD-81B1-569534F4634A}"/>
+              </a:ext>
+            </a:extLst>
+          </p:cNvPr>
+          <p:cNvSpPr>
+            <a:spLocks noGrp="1"/>
+          </p:cNvSpPr>
+          <p:nvPr>
+            <p:ph type="title"/>
+          </p:nvPr>
+        </p:nvSpPr>
+        <p:spPr/>
+        <p:txBody>
+          <a:bodyPr/>
+          <a:lstStyle/>
+          <a:p>
+            <a:pPr algn="ctr"/>
+            <a:r>
+              <a:rPr lang="en-US" b="1" dirty="0">
                 <a:latin typeface="Calibri" panose="020F0502020204030204" pitchFamily="34" charset="0"/>
                 <a:cs typeface="Calibri" panose="020F0502020204030204" pitchFamily="34" charset="0"/>
               </a:rPr>
-              <a:t> </a:t>
-            </a:r>
-            <a:br>
-              <a:rPr lang="en-US" sz="4400" dirty="0" smtClean="0">
+              <a:t>System Sequence diagram </a:t>
+            </a:r>
+          </a:p>
+        </p:txBody>
+      </p:sp>
+      <p:sp>
+        <p:nvSpPr>
+          <p:cNvPr id="3" name="Content Placeholder 2">
+            <a:extLst>
+              <a:ext uri="{FF2B5EF4-FFF2-40B4-BE49-F238E27FC236}">
+                <a16:creationId xmlns:a16="http://schemas.microsoft.com/office/drawing/2014/main" id="{7C39B00A-AB72-4B7A-ABC6-BDF48DFADE1E}"/>
+              </a:ext>
+            </a:extLst>
+          </p:cNvPr>
+          <p:cNvSpPr>
+            <a:spLocks noGrp="1"/>
+          </p:cNvSpPr>
+          <p:nvPr>
+            <p:ph sz="half" idx="1"/>
+          </p:nvPr>
+        </p:nvSpPr>
+        <p:spPr/>
+        <p:txBody>
+          <a:bodyPr/>
+          <a:lstStyle/>
+          <a:p>
+            <a:endParaRPr lang="en-US"/>
+          </a:p>
+        </p:txBody>
+      </p:sp>
+      <p:sp>
+        <p:nvSpPr>
+          <p:cNvPr id="4" name="Content Placeholder 3">
+            <a:extLst>
+              <a:ext uri="{FF2B5EF4-FFF2-40B4-BE49-F238E27FC236}">
+                <a16:creationId xmlns:a16="http://schemas.microsoft.com/office/drawing/2014/main" id="{B1B98F97-D802-4F60-A6C2-9F50DE1A03CB}"/>
+              </a:ext>
+            </a:extLst>
+          </p:cNvPr>
+          <p:cNvSpPr>
+            <a:spLocks noGrp="1"/>
+          </p:cNvSpPr>
+          <p:nvPr>
+            <p:ph sz="half" idx="2"/>
+          </p:nvPr>
+        </p:nvSpPr>
+        <p:spPr/>
+        <p:txBody>
+          <a:bodyPr/>
+          <a:lstStyle/>
+          <a:p>
+            <a:endParaRPr lang="en-US"/>
+          </a:p>
+        </p:txBody>
+      </p:sp>
+    </p:spTree>
+    <p:extLst>
+      <p:ext uri="{BB962C8B-B14F-4D97-AF65-F5344CB8AC3E}">
+        <p14:creationId xmlns:p14="http://schemas.microsoft.com/office/powerpoint/2010/main" val="596726536"/>
+      </p:ext>
+    </p:extLst>
+  </p:cSld>
+  <p:clrMapOvr>
+    <a:masterClrMapping/>
+  </p:clrMapOvr>
+</p:sld>
+</file>
+
+<file path=ppt/slides/slide7.xml><?xml version="1.0" encoding="utf-8"?>
+<p:sld xmlns:a="http://schemas.openxmlformats.org/drawingml/2006/main" xmlns:r="http://schemas.openxmlformats.org/officeDocument/2006/relationships" xmlns:p="http://schemas.openxmlformats.org/presentationml/2006/main">
+  <p:cSld>
+    <p:spTree>
+      <p:nvGrpSpPr>
+        <p:cNvPr id="1" name=""/>
+        <p:cNvGrpSpPr/>
+        <p:nvPr/>
+      </p:nvGrpSpPr>
+      <p:grpSpPr>
+        <a:xfrm>
+          <a:off x="0" y="0"/>
+          <a:ext cx="0" cy="0"/>
+          <a:chOff x="0" y="0"/>
+          <a:chExt cx="0" cy="0"/>
+        </a:xfrm>
+      </p:grpSpPr>
+      <p:sp>
+        <p:nvSpPr>
+          <p:cNvPr id="2" name="Title 1">
+            <a:extLst>
+              <a:ext uri="{FF2B5EF4-FFF2-40B4-BE49-F238E27FC236}">
+                <a16:creationId xmlns:a16="http://schemas.microsoft.com/office/drawing/2014/main" id="{63BD7513-DDA3-469E-844C-EC72C8B3D232}"/>
+              </a:ext>
+            </a:extLst>
+          </p:cNvPr>
+          <p:cNvSpPr>
+            <a:spLocks noGrp="1"/>
+          </p:cNvSpPr>
+          <p:nvPr>
+            <p:ph type="title"/>
+          </p:nvPr>
+        </p:nvSpPr>
+        <p:spPr/>
+        <p:txBody>
+          <a:bodyPr/>
+          <a:lstStyle/>
+          <a:p>
+            <a:pPr algn="ctr"/>
+            <a:r>
+              <a:rPr lang="en-US" b="1" dirty="0">
                 <a:latin typeface="Calibri" panose="020F0502020204030204" pitchFamily="34" charset="0"/>
                 <a:cs typeface="Calibri" panose="020F0502020204030204" pitchFamily="34" charset="0"/>
               </a:rPr>
-            </a:br>
-            <a:r>
-              <a:rPr lang="en-US" sz="4000" b="1" dirty="0" smtClean="0">
+              <a:t>Domain Class Diagram </a:t>
+            </a:r>
+          </a:p>
+        </p:txBody>
+      </p:sp>
+      <p:sp>
+        <p:nvSpPr>
+          <p:cNvPr id="3" name="Content Placeholder 2">
+            <a:extLst>
+              <a:ext uri="{FF2B5EF4-FFF2-40B4-BE49-F238E27FC236}">
+                <a16:creationId xmlns:a16="http://schemas.microsoft.com/office/drawing/2014/main" id="{16C7F4E0-8748-4F2E-AD23-75695D75295A}"/>
+              </a:ext>
+            </a:extLst>
+          </p:cNvPr>
+          <p:cNvSpPr>
+            <a:spLocks noGrp="1"/>
+          </p:cNvSpPr>
+          <p:nvPr>
+            <p:ph sz="half" idx="1"/>
+          </p:nvPr>
+        </p:nvSpPr>
+        <p:spPr/>
+        <p:txBody>
+          <a:bodyPr/>
+          <a:lstStyle/>
+          <a:p>
+            <a:endParaRPr lang="en-US"/>
+          </a:p>
+        </p:txBody>
+      </p:sp>
+      <p:sp>
+        <p:nvSpPr>
+          <p:cNvPr id="4" name="Content Placeholder 3">
+            <a:extLst>
+              <a:ext uri="{FF2B5EF4-FFF2-40B4-BE49-F238E27FC236}">
+                <a16:creationId xmlns:a16="http://schemas.microsoft.com/office/drawing/2014/main" id="{879B8089-5410-4BF8-99ED-780577B322B8}"/>
+              </a:ext>
+            </a:extLst>
+          </p:cNvPr>
+          <p:cNvSpPr>
+            <a:spLocks noGrp="1"/>
+          </p:cNvSpPr>
+          <p:nvPr>
+            <p:ph sz="half" idx="2"/>
+          </p:nvPr>
+        </p:nvSpPr>
+        <p:spPr/>
+        <p:txBody>
+          <a:bodyPr/>
+          <a:lstStyle/>
+          <a:p>
+            <a:endParaRPr lang="en-US"/>
+          </a:p>
+        </p:txBody>
+      </p:sp>
+    </p:spTree>
+    <p:extLst>
+      <p:ext uri="{BB962C8B-B14F-4D97-AF65-F5344CB8AC3E}">
+        <p14:creationId xmlns:p14="http://schemas.microsoft.com/office/powerpoint/2010/main" val="4255083623"/>
+      </p:ext>
+    </p:extLst>
+  </p:cSld>
+  <p:clrMapOvr>
+    <a:masterClrMapping/>
+  </p:clrMapOvr>
+</p:sld>
+</file>
+
+<file path=ppt/slides/slide8.xml><?xml version="1.0" encoding="utf-8"?>
+<p:sld xmlns:a="http://schemas.openxmlformats.org/drawingml/2006/main" xmlns:r="http://schemas.openxmlformats.org/officeDocument/2006/relationships" xmlns:p="http://schemas.openxmlformats.org/presentationml/2006/main">
+  <p:cSld>
+    <p:spTree>
+      <p:nvGrpSpPr>
+        <p:cNvPr id="1" name=""/>
+        <p:cNvGrpSpPr/>
+        <p:nvPr/>
+      </p:nvGrpSpPr>
+      <p:grpSpPr>
+        <a:xfrm>
+          <a:off x="0" y="0"/>
+          <a:ext cx="0" cy="0"/>
+          <a:chOff x="0" y="0"/>
+          <a:chExt cx="0" cy="0"/>
+        </a:xfrm>
+      </p:grpSpPr>
+      <p:sp>
+        <p:nvSpPr>
+          <p:cNvPr id="2" name="Title 1">
+            <a:extLst>
+              <a:ext uri="{FF2B5EF4-FFF2-40B4-BE49-F238E27FC236}">
+                <a16:creationId xmlns:a16="http://schemas.microsoft.com/office/drawing/2014/main" id="{2A861907-2B50-47B1-BC16-BA9802B83033}"/>
+              </a:ext>
+            </a:extLst>
+          </p:cNvPr>
+          <p:cNvSpPr>
+            <a:spLocks noGrp="1"/>
+          </p:cNvSpPr>
+          <p:nvPr>
+            <p:ph type="title"/>
+          </p:nvPr>
+        </p:nvSpPr>
+        <p:spPr/>
+        <p:txBody>
+          <a:bodyPr/>
+          <a:lstStyle/>
+          <a:p>
+            <a:pPr algn="ctr"/>
+            <a:r>
+              <a:rPr lang="en-US" b="1" dirty="0">
                 <a:latin typeface="Calibri" panose="020F0502020204030204" pitchFamily="34" charset="0"/>
                 <a:cs typeface="Calibri" panose="020F0502020204030204" pitchFamily="34" charset="0"/>
               </a:rPr>
-              <a:t>the  Vikings</a:t>
-            </a:r>
-            <a:br>
-              <a:rPr lang="en-US" sz="4000" b="1" dirty="0" smtClean="0">
+              <a:t>Reverse engineered Class Diagram</a:t>
+            </a:r>
+            <a:endParaRPr lang="en-US" dirty="0"/>
+          </a:p>
+        </p:txBody>
+      </p:sp>
+      <p:sp>
+        <p:nvSpPr>
+          <p:cNvPr id="3" name="Content Placeholder 2">
+            <a:extLst>
+              <a:ext uri="{FF2B5EF4-FFF2-40B4-BE49-F238E27FC236}">
+                <a16:creationId xmlns:a16="http://schemas.microsoft.com/office/drawing/2014/main" id="{D8992F48-4428-46AF-BA35-1C409BD427C4}"/>
+              </a:ext>
+            </a:extLst>
+          </p:cNvPr>
+          <p:cNvSpPr>
+            <a:spLocks noGrp="1"/>
+          </p:cNvSpPr>
+          <p:nvPr>
+            <p:ph idx="1"/>
+          </p:nvPr>
+        </p:nvSpPr>
+        <p:spPr/>
+        <p:txBody>
+          <a:bodyPr/>
+          <a:lstStyle/>
+          <a:p>
+            <a:endParaRPr lang="en-US"/>
+          </a:p>
+        </p:txBody>
+      </p:sp>
+    </p:spTree>
+    <p:extLst>
+      <p:ext uri="{BB962C8B-B14F-4D97-AF65-F5344CB8AC3E}">
+        <p14:creationId xmlns:p14="http://schemas.microsoft.com/office/powerpoint/2010/main" val="3253085804"/>
+      </p:ext>
+    </p:extLst>
+  </p:cSld>
+  <p:clrMapOvr>
+    <a:masterClrMapping/>
+  </p:clrMapOvr>
+</p:sld>
+</file>
+
+<file path=ppt/slides/slide9.xml><?xml version="1.0" encoding="utf-8"?>
+<p:sld xmlns:a="http://schemas.openxmlformats.org/drawingml/2006/main" xmlns:r="http://schemas.openxmlformats.org/officeDocument/2006/relationships" xmlns:p="http://schemas.openxmlformats.org/presentationml/2006/main">
+  <p:cSld>
+    <p:spTree>
+      <p:nvGrpSpPr>
+        <p:cNvPr id="1" name=""/>
+        <p:cNvGrpSpPr/>
+        <p:nvPr/>
+      </p:nvGrpSpPr>
+      <p:grpSpPr>
+        <a:xfrm>
+          <a:off x="0" y="0"/>
+          <a:ext cx="0" cy="0"/>
+          <a:chOff x="0" y="0"/>
+          <a:chExt cx="0" cy="0"/>
+        </a:xfrm>
+      </p:grpSpPr>
+      <p:sp>
+        <p:nvSpPr>
+          <p:cNvPr id="2" name="Title 1">
+            <a:extLst>
+              <a:ext uri="{FF2B5EF4-FFF2-40B4-BE49-F238E27FC236}">
+                <a16:creationId xmlns:a16="http://schemas.microsoft.com/office/drawing/2014/main" id="{5B3D2A5C-0963-44CD-AC29-80949461B143}"/>
+              </a:ext>
+            </a:extLst>
+          </p:cNvPr>
+          <p:cNvSpPr>
+            <a:spLocks noGrp="1"/>
+          </p:cNvSpPr>
+          <p:nvPr>
+            <p:ph type="title"/>
+          </p:nvPr>
+        </p:nvSpPr>
+        <p:spPr/>
+        <p:txBody>
+          <a:bodyPr/>
+          <a:lstStyle/>
+          <a:p>
+            <a:pPr algn="ctr"/>
+            <a:r>
+              <a:rPr lang="en-US" b="1" dirty="0">
                 <a:latin typeface="Calibri" panose="020F0502020204030204" pitchFamily="34" charset="0"/>
                 <a:cs typeface="Calibri" panose="020F0502020204030204" pitchFamily="34" charset="0"/>
               </a:rPr>
-            </a:br>
-            <a:r>
-              <a:rPr lang="en-US" sz="4000" b="1" dirty="0">
-                <a:latin typeface="Calibri" panose="020F0502020204030204" pitchFamily="34" charset="0"/>
-                <a:cs typeface="Calibri" panose="020F0502020204030204" pitchFamily="34" charset="0"/>
-              </a:rPr>
-              <a:t/>
-            </a:r>
-            <a:br>
-              <a:rPr lang="en-US" sz="4000" b="1" dirty="0">
-                <a:latin typeface="Calibri" panose="020F0502020204030204" pitchFamily="34" charset="0"/>
-                <a:cs typeface="Calibri" panose="020F0502020204030204" pitchFamily="34" charset="0"/>
-              </a:rPr>
-            </a:br>
-            <a:r>
-              <a:rPr lang="en-US" sz="4000" b="1" dirty="0" smtClean="0">
-                <a:latin typeface="Calibri" panose="020F0502020204030204" pitchFamily="34" charset="0"/>
-                <a:cs typeface="Calibri" panose="020F0502020204030204" pitchFamily="34" charset="0"/>
-              </a:rPr>
-              <a:t/>
-            </a:r>
-            <a:br>
-              <a:rPr lang="en-US" sz="4000" b="1" dirty="0" smtClean="0">
-                <a:latin typeface="Calibri" panose="020F0502020204030204" pitchFamily="34" charset="0"/>
-                <a:cs typeface="Calibri" panose="020F0502020204030204" pitchFamily="34" charset="0"/>
-              </a:rPr>
-            </a:br>
-            <a:r>
-              <a:rPr lang="en-US" sz="4000" b="1" dirty="0">
-                <a:latin typeface="Calibri" panose="020F0502020204030204" pitchFamily="34" charset="0"/>
-                <a:cs typeface="Calibri" panose="020F0502020204030204" pitchFamily="34" charset="0"/>
-              </a:rPr>
-              <a:t/>
-            </a:r>
-            <a:br>
-              <a:rPr lang="en-US" sz="4000" b="1" dirty="0">
-                <a:latin typeface="Calibri" panose="020F0502020204030204" pitchFamily="34" charset="0"/>
-                <a:cs typeface="Calibri" panose="020F0502020204030204" pitchFamily="34" charset="0"/>
-              </a:rPr>
-            </a:br>
-            <a:r>
-              <a:rPr lang="en-US" sz="4000" b="1" dirty="0" smtClean="0">
-                <a:latin typeface="Calibri" panose="020F0502020204030204" pitchFamily="34" charset="0"/>
-                <a:cs typeface="Calibri" panose="020F0502020204030204" pitchFamily="34" charset="0"/>
-              </a:rPr>
-              <a:t/>
-            </a:r>
-            <a:br>
-              <a:rPr lang="en-US" sz="4000" b="1" dirty="0" smtClean="0">
-                <a:latin typeface="Calibri" panose="020F0502020204030204" pitchFamily="34" charset="0"/>
-                <a:cs typeface="Calibri" panose="020F0502020204030204" pitchFamily="34" charset="0"/>
-              </a:rPr>
-            </a:br>
-            <a:endParaRPr lang="en-US" sz="4000" b="1" dirty="0"/>
+              <a:t>One code smell</a:t>
+            </a:r>
+          </a:p>
+        </p:txBody>
+      </p:sp>
+      <p:sp>
+        <p:nvSpPr>
+          <p:cNvPr id="3" name="Content Placeholder 2">
+            <a:extLst>
+              <a:ext uri="{FF2B5EF4-FFF2-40B4-BE49-F238E27FC236}">
+                <a16:creationId xmlns:a16="http://schemas.microsoft.com/office/drawing/2014/main" id="{ED6468B1-FE05-4AD6-8D35-CE389B5A0BBA}"/>
+              </a:ext>
+            </a:extLst>
+          </p:cNvPr>
+          <p:cNvSpPr>
+            <a:spLocks noGrp="1"/>
+          </p:cNvSpPr>
+          <p:nvPr>
+            <p:ph sz="half" idx="1"/>
+          </p:nvPr>
+        </p:nvSpPr>
+        <p:spPr/>
+        <p:txBody>
+          <a:bodyPr/>
+          <a:lstStyle/>
+          <a:p>
+            <a:r>
+              <a:rPr lang="en-US" dirty="0"/>
+              <a:t>Before</a:t>
+            </a:r>
+          </a:p>
+        </p:txBody>
+      </p:sp>
+      <p:sp>
+        <p:nvSpPr>
+          <p:cNvPr id="4" name="Content Placeholder 3">
+            <a:extLst>
+              <a:ext uri="{FF2B5EF4-FFF2-40B4-BE49-F238E27FC236}">
+                <a16:creationId xmlns:a16="http://schemas.microsoft.com/office/drawing/2014/main" id="{E3085887-AACC-4A91-A5C6-BAEC652F5D29}"/>
+              </a:ext>
+            </a:extLst>
+          </p:cNvPr>
+          <p:cNvSpPr>
+            <a:spLocks noGrp="1"/>
+          </p:cNvSpPr>
+          <p:nvPr>
+            <p:ph sz="half" idx="2"/>
+          </p:nvPr>
+        </p:nvSpPr>
+        <p:spPr/>
+        <p:txBody>
+          <a:bodyPr/>
+          <a:lstStyle/>
+          <a:p>
+            <a:r>
+              <a:rPr lang="en-US" dirty="0"/>
+              <a:t>After</a:t>
+            </a:r>
           </a:p>
         </p:txBody>
       </p:sp>
     </p:spTree>
     <p:extLst>
       <p:ext uri="{BB962C8B-B14F-4D97-AF65-F5344CB8AC3E}">
-        <p14:creationId xmlns:p14="http://schemas.microsoft.com/office/powerpoint/2010/main" val="2496442798"/>
+        <p14:creationId xmlns:p14="http://schemas.microsoft.com/office/powerpoint/2010/main" val="3385180618"/>
       </p:ext>
     </p:extLst>
   </p:cSld>

</xml_diff>

<commit_message>
First draft of the Final presentation, capturing all the requirements
</commit_message>
<xml_diff>
--- a/Final_Presentation.pptx
+++ b/Final_Presentation.pptx
@@ -6,14 +6,15 @@
   </p:sldMasterIdLst>
   <p:sldIdLst>
     <p:sldId id="256" r:id="rId2"/>
-    <p:sldId id="257" r:id="rId3"/>
-    <p:sldId id="259" r:id="rId4"/>
-    <p:sldId id="258" r:id="rId5"/>
-    <p:sldId id="261" r:id="rId6"/>
-    <p:sldId id="260" r:id="rId7"/>
-    <p:sldId id="262" r:id="rId8"/>
-    <p:sldId id="263" r:id="rId9"/>
-    <p:sldId id="264" r:id="rId10"/>
+    <p:sldId id="265" r:id="rId3"/>
+    <p:sldId id="266" r:id="rId4"/>
+    <p:sldId id="267" r:id="rId5"/>
+    <p:sldId id="258" r:id="rId6"/>
+    <p:sldId id="261" r:id="rId7"/>
+    <p:sldId id="270" r:id="rId8"/>
+    <p:sldId id="268" r:id="rId9"/>
+    <p:sldId id="263" r:id="rId10"/>
+    <p:sldId id="264" r:id="rId11"/>
   </p:sldIdLst>
   <p:sldSz cx="12192000" cy="6858000"/>
   <p:notesSz cx="6858000" cy="9144000"/>
@@ -3591,8 +3592,8 @@
         </p:nvSpPr>
         <p:spPr>
           <a:xfrm>
-            <a:off x="1077238" y="802298"/>
-            <a:ext cx="10634597" cy="2541431"/>
+            <a:off x="698270" y="199506"/>
+            <a:ext cx="11013566" cy="3144224"/>
           </a:xfrm>
         </p:spPr>
         <p:txBody>
@@ -3603,14 +3604,89 @@
           <a:p>
             <a:pPr algn="ctr"/>
             <a:r>
-              <a:rPr lang="en-US" sz="4400" dirty="0"/>
-              <a:t>Hotel Checking system </a:t>
+              <a:rPr lang="en-US" sz="1800" dirty="0" err="1" smtClean="0">
+                <a:latin typeface="Calibri" panose="020F0502020204030204" pitchFamily="34" charset="0"/>
+                <a:cs typeface="Calibri" panose="020F0502020204030204" pitchFamily="34" charset="0"/>
+              </a:rPr>
+              <a:t>Seis</a:t>
+            </a:r>
+            <a:r>
+              <a:rPr lang="en-US" sz="1800" dirty="0" smtClean="0">
+                <a:latin typeface="Calibri" panose="020F0502020204030204" pitchFamily="34" charset="0"/>
+                <a:cs typeface="Calibri" panose="020F0502020204030204" pitchFamily="34" charset="0"/>
+              </a:rPr>
+              <a:t> 635: Software analysis and design</a:t>
             </a:r>
             <a:br>
-              <a:rPr lang="en-US" sz="4400" dirty="0"/>
+              <a:rPr lang="en-US" sz="1800" dirty="0" smtClean="0">
+                <a:latin typeface="Calibri" panose="020F0502020204030204" pitchFamily="34" charset="0"/>
+                <a:cs typeface="Calibri" panose="020F0502020204030204" pitchFamily="34" charset="0"/>
+              </a:rPr>
             </a:br>
             <a:r>
-              <a:rPr lang="en-US" sz="4400" dirty="0"/>
+              <a:rPr lang="en-US" sz="1800" dirty="0">
+                <a:latin typeface="Calibri" panose="020F0502020204030204" pitchFamily="34" charset="0"/>
+                <a:cs typeface="Calibri" panose="020F0502020204030204" pitchFamily="34" charset="0"/>
+              </a:rPr>
+              <a:t/>
+            </a:r>
+            <a:br>
+              <a:rPr lang="en-US" sz="1800" dirty="0">
+                <a:latin typeface="Calibri" panose="020F0502020204030204" pitchFamily="34" charset="0"/>
+                <a:cs typeface="Calibri" panose="020F0502020204030204" pitchFamily="34" charset="0"/>
+              </a:rPr>
+            </a:br>
+            <a:r>
+              <a:rPr lang="en-US" sz="1800" dirty="0" smtClean="0">
+                <a:latin typeface="Calibri" panose="020F0502020204030204" pitchFamily="34" charset="0"/>
+                <a:cs typeface="Calibri" panose="020F0502020204030204" pitchFamily="34" charset="0"/>
+              </a:rPr>
+              <a:t/>
+            </a:r>
+            <a:br>
+              <a:rPr lang="en-US" sz="1800" dirty="0" smtClean="0">
+                <a:latin typeface="Calibri" panose="020F0502020204030204" pitchFamily="34" charset="0"/>
+                <a:cs typeface="Calibri" panose="020F0502020204030204" pitchFamily="34" charset="0"/>
+              </a:rPr>
+            </a:br>
+            <a:r>
+              <a:rPr lang="en-US" sz="1800" dirty="0" smtClean="0">
+                <a:latin typeface="Calibri" panose="020F0502020204030204" pitchFamily="34" charset="0"/>
+                <a:cs typeface="Calibri" panose="020F0502020204030204" pitchFamily="34" charset="0"/>
+              </a:rPr>
+              <a:t/>
+            </a:r>
+            <a:br>
+              <a:rPr lang="en-US" sz="1800" dirty="0" smtClean="0">
+                <a:latin typeface="Calibri" panose="020F0502020204030204" pitchFamily="34" charset="0"/>
+                <a:cs typeface="Calibri" panose="020F0502020204030204" pitchFamily="34" charset="0"/>
+              </a:rPr>
+            </a:br>
+            <a:r>
+              <a:rPr lang="en-US" sz="4800" b="1" dirty="0" smtClean="0">
+                <a:latin typeface="Calibri" panose="020F0502020204030204" pitchFamily="34" charset="0"/>
+                <a:cs typeface="Calibri" panose="020F0502020204030204" pitchFamily="34" charset="0"/>
+              </a:rPr>
+              <a:t>Hotel </a:t>
+            </a:r>
+            <a:r>
+              <a:rPr lang="en-US" sz="4800" b="1" dirty="0">
+                <a:latin typeface="Calibri" panose="020F0502020204030204" pitchFamily="34" charset="0"/>
+                <a:cs typeface="Calibri" panose="020F0502020204030204" pitchFamily="34" charset="0"/>
+              </a:rPr>
+              <a:t>Checking system </a:t>
+            </a:r>
+            <a:br>
+              <a:rPr lang="en-US" sz="4800" b="1" dirty="0">
+                <a:latin typeface="Calibri" panose="020F0502020204030204" pitchFamily="34" charset="0"/>
+                <a:cs typeface="Calibri" panose="020F0502020204030204" pitchFamily="34" charset="0"/>
+              </a:rPr>
+            </a:br>
+            <a:r>
+              <a:rPr lang="en-US" sz="1800" dirty="0">
+                <a:latin typeface="Calibri" panose="020F0502020204030204" pitchFamily="34" charset="0"/>
+                <a:cs typeface="Calibri" panose="020F0502020204030204" pitchFamily="34" charset="0"/>
+              </a:rPr>
               <a:t> </a:t>
             </a:r>
           </a:p>
@@ -3628,7 +3704,7 @@
         </p:nvSpPr>
         <p:spPr>
           <a:xfrm>
-            <a:off x="1215025" y="3531204"/>
+            <a:off x="1285139" y="3522892"/>
             <a:ext cx="9839827" cy="2556445"/>
           </a:xfrm>
         </p:spPr>
@@ -3673,6 +3749,13 @@
               </a:rPr>
               <a:t>Nyaundi</a:t>
             </a:r>
+            <a:r>
+              <a:rPr lang="en-US" sz="2800" dirty="0">
+                <a:latin typeface="Calibri" panose="020F0502020204030204" pitchFamily="34" charset="0"/>
+                <a:cs typeface="Calibri" panose="020F0502020204030204" pitchFamily="34" charset="0"/>
+              </a:rPr>
+              <a:t/>
+            </a:r>
             <a:br>
               <a:rPr lang="en-US" sz="2800" dirty="0">
                 <a:latin typeface="Calibri" panose="020F0502020204030204" pitchFamily="34" charset="0"/>
@@ -3693,6 +3776,13 @@
               </a:rPr>
               <a:t>Ndenge</a:t>
             </a:r>
+            <a:r>
+              <a:rPr lang="en-US" sz="2800" dirty="0">
+                <a:latin typeface="Calibri" panose="020F0502020204030204" pitchFamily="34" charset="0"/>
+                <a:cs typeface="Calibri" panose="020F0502020204030204" pitchFamily="34" charset="0"/>
+              </a:rPr>
+              <a:t/>
+            </a:r>
             <a:br>
               <a:rPr lang="en-US" sz="2800" dirty="0">
                 <a:latin typeface="Calibri" panose="020F0502020204030204" pitchFamily="34" charset="0"/>
@@ -3732,6 +3822,10 @@
                 <a:cs typeface="Calibri" panose="020F0502020204030204" pitchFamily="34" charset="0"/>
               </a:rPr>
               <a:t>Shes</a:t>
+            </a:r>
+            <a:r>
+              <a:rPr lang="en-US" sz="2800" dirty="0"/>
+              <a:t/>
             </a:r>
             <a:br>
               <a:rPr lang="en-US" sz="2800" dirty="0"/>
@@ -3744,6 +3838,124 @@
     <p:extLst>
       <p:ext uri="{BB962C8B-B14F-4D97-AF65-F5344CB8AC3E}">
         <p14:creationId xmlns:p14="http://schemas.microsoft.com/office/powerpoint/2010/main" val="1886694473"/>
+      </p:ext>
+    </p:extLst>
+  </p:cSld>
+  <p:clrMapOvr>
+    <a:masterClrMapping/>
+  </p:clrMapOvr>
+</p:sld>
+</file>
+
+<file path=ppt/slides/slide10.xml><?xml version="1.0" encoding="utf-8"?>
+<p:sld xmlns:a="http://schemas.openxmlformats.org/drawingml/2006/main" xmlns:r="http://schemas.openxmlformats.org/officeDocument/2006/relationships" xmlns:p="http://schemas.openxmlformats.org/presentationml/2006/main">
+  <p:cSld>
+    <p:spTree>
+      <p:nvGrpSpPr>
+        <p:cNvPr id="1" name=""/>
+        <p:cNvGrpSpPr/>
+        <p:nvPr/>
+      </p:nvGrpSpPr>
+      <p:grpSpPr>
+        <a:xfrm>
+          <a:off x="0" y="0"/>
+          <a:ext cx="0" cy="0"/>
+          <a:chOff x="0" y="0"/>
+          <a:chExt cx="0" cy="0"/>
+        </a:xfrm>
+      </p:grpSpPr>
+      <p:sp>
+        <p:nvSpPr>
+          <p:cNvPr id="2" name="Title 1">
+            <a:extLst>
+              <a:ext uri="{FF2B5EF4-FFF2-40B4-BE49-F238E27FC236}">
+                <a16:creationId xmlns:a16="http://schemas.microsoft.com/office/drawing/2014/main" id="{5B3D2A5C-0963-44CD-AC29-80949461B143}"/>
+              </a:ext>
+            </a:extLst>
+          </p:cNvPr>
+          <p:cNvSpPr>
+            <a:spLocks noGrp="1"/>
+          </p:cNvSpPr>
+          <p:nvPr>
+            <p:ph type="title"/>
+          </p:nvPr>
+        </p:nvSpPr>
+        <p:spPr/>
+        <p:txBody>
+          <a:bodyPr/>
+          <a:lstStyle/>
+          <a:p>
+            <a:pPr algn="ctr"/>
+            <a:r>
+              <a:rPr lang="en-US" b="1" dirty="0">
+                <a:latin typeface="Calibri" panose="020F0502020204030204" pitchFamily="34" charset="0"/>
+                <a:cs typeface="Calibri" panose="020F0502020204030204" pitchFamily="34" charset="0"/>
+              </a:rPr>
+              <a:t>One code smell</a:t>
+            </a:r>
+          </a:p>
+        </p:txBody>
+      </p:sp>
+      <p:sp>
+        <p:nvSpPr>
+          <p:cNvPr id="3" name="Content Placeholder 2">
+            <a:extLst>
+              <a:ext uri="{FF2B5EF4-FFF2-40B4-BE49-F238E27FC236}">
+                <a16:creationId xmlns:a16="http://schemas.microsoft.com/office/drawing/2014/main" id="{ED6468B1-FE05-4AD6-8D35-CE389B5A0BBA}"/>
+              </a:ext>
+            </a:extLst>
+          </p:cNvPr>
+          <p:cNvSpPr>
+            <a:spLocks noGrp="1"/>
+          </p:cNvSpPr>
+          <p:nvPr>
+            <p:ph sz="half" idx="1"/>
+          </p:nvPr>
+        </p:nvSpPr>
+        <p:spPr/>
+        <p:txBody>
+          <a:bodyPr/>
+          <a:lstStyle/>
+          <a:p>
+            <a:r>
+              <a:rPr lang="en-US" dirty="0"/>
+              <a:t>Before</a:t>
+            </a:r>
+          </a:p>
+        </p:txBody>
+      </p:sp>
+      <p:sp>
+        <p:nvSpPr>
+          <p:cNvPr id="4" name="Content Placeholder 3">
+            <a:extLst>
+              <a:ext uri="{FF2B5EF4-FFF2-40B4-BE49-F238E27FC236}">
+                <a16:creationId xmlns:a16="http://schemas.microsoft.com/office/drawing/2014/main" id="{E3085887-AACC-4A91-A5C6-BAEC652F5D29}"/>
+              </a:ext>
+            </a:extLst>
+          </p:cNvPr>
+          <p:cNvSpPr>
+            <a:spLocks noGrp="1"/>
+          </p:cNvSpPr>
+          <p:nvPr>
+            <p:ph sz="half" idx="2"/>
+          </p:nvPr>
+        </p:nvSpPr>
+        <p:spPr/>
+        <p:txBody>
+          <a:bodyPr/>
+          <a:lstStyle/>
+          <a:p>
+            <a:r>
+              <a:rPr lang="en-US" dirty="0"/>
+              <a:t>After</a:t>
+            </a:r>
+          </a:p>
+        </p:txBody>
+      </p:sp>
+    </p:spTree>
+    <p:extLst>
+      <p:ext uri="{BB962C8B-B14F-4D97-AF65-F5344CB8AC3E}">
+        <p14:creationId xmlns:p14="http://schemas.microsoft.com/office/powerpoint/2010/main" val="3385180618"/>
       </p:ext>
     </p:extLst>
   </p:cSld>
@@ -3772,13 +3984,7 @@
       </p:grpSpPr>
       <p:sp>
         <p:nvSpPr>
-          <p:cNvPr id="2" name="Title 1">
-            <a:extLst>
-              <a:ext uri="{FF2B5EF4-FFF2-40B4-BE49-F238E27FC236}">
-                <a16:creationId xmlns:a16="http://schemas.microsoft.com/office/drawing/2014/main" id="{CF9DDB5E-69C6-4B2C-81A6-433435B9327A}"/>
-              </a:ext>
-            </a:extLst>
-          </p:cNvPr>
+          <p:cNvPr id="2" name="Title 1"/>
           <p:cNvSpPr>
             <a:spLocks noGrp="1"/>
           </p:cNvSpPr>
@@ -3786,126 +3992,194 @@
             <p:ph type="title"/>
           </p:nvPr>
         </p:nvSpPr>
-        <p:spPr/>
-        <p:txBody>
-          <a:bodyPr/>
+        <p:spPr>
+          <a:xfrm>
+            <a:off x="1534707" y="505262"/>
+            <a:ext cx="9603275" cy="766586"/>
+          </a:xfrm>
+        </p:spPr>
+        <p:txBody>
+          <a:bodyPr anchor="ctr"/>
           <a:lstStyle/>
           <a:p>
             <a:pPr algn="ctr"/>
             <a:r>
-              <a:rPr lang="en-US" b="1" dirty="0">
-                <a:latin typeface="Calibri" panose="020F0502020204030204" pitchFamily="34" charset="0"/>
-                <a:cs typeface="Calibri" panose="020F0502020204030204" pitchFamily="34" charset="0"/>
-              </a:rPr>
-              <a:t>overview</a:t>
-            </a:r>
-          </a:p>
-        </p:txBody>
-      </p:sp>
-      <p:sp>
-        <p:nvSpPr>
-          <p:cNvPr id="3" name="Text Placeholder 2">
-            <a:extLst>
-              <a:ext uri="{FF2B5EF4-FFF2-40B4-BE49-F238E27FC236}">
-                <a16:creationId xmlns:a16="http://schemas.microsoft.com/office/drawing/2014/main" id="{A3822016-9C30-4391-BE4C-9BFB06C829AC}"/>
-              </a:ext>
-            </a:extLst>
-          </p:cNvPr>
-          <p:cNvSpPr>
-            <a:spLocks noGrp="1"/>
-          </p:cNvSpPr>
-          <p:nvPr>
-            <p:ph type="body" idx="1"/>
-          </p:nvPr>
-        </p:nvSpPr>
-        <p:spPr/>
-        <p:txBody>
-          <a:bodyPr/>
-          <a:lstStyle/>
-          <a:p>
-            <a:endParaRPr lang="en-US" dirty="0"/>
-          </a:p>
-        </p:txBody>
-      </p:sp>
-      <p:sp>
-        <p:nvSpPr>
-          <p:cNvPr id="4" name="Content Placeholder 3">
-            <a:extLst>
-              <a:ext uri="{FF2B5EF4-FFF2-40B4-BE49-F238E27FC236}">
-                <a16:creationId xmlns:a16="http://schemas.microsoft.com/office/drawing/2014/main" id="{158768A3-92F2-4B2C-81DB-397ACB781B7C}"/>
-              </a:ext>
-            </a:extLst>
-          </p:cNvPr>
-          <p:cNvSpPr>
-            <a:spLocks noGrp="1"/>
-          </p:cNvSpPr>
-          <p:nvPr>
-            <p:ph sz="half" idx="2"/>
-          </p:nvPr>
-        </p:nvSpPr>
-        <p:spPr/>
-        <p:txBody>
-          <a:bodyPr/>
-          <a:lstStyle/>
-          <a:p>
-            <a:endParaRPr lang="en-US"/>
-          </a:p>
-        </p:txBody>
-      </p:sp>
-      <p:sp>
-        <p:nvSpPr>
-          <p:cNvPr id="5" name="Text Placeholder 4">
-            <a:extLst>
-              <a:ext uri="{FF2B5EF4-FFF2-40B4-BE49-F238E27FC236}">
-                <a16:creationId xmlns:a16="http://schemas.microsoft.com/office/drawing/2014/main" id="{0C956753-BD80-4F51-A84D-BF26E725BC27}"/>
-              </a:ext>
-            </a:extLst>
-          </p:cNvPr>
-          <p:cNvSpPr>
-            <a:spLocks noGrp="1"/>
-          </p:cNvSpPr>
-          <p:nvPr>
-            <p:ph type="body" sz="quarter" idx="3"/>
-          </p:nvPr>
-        </p:nvSpPr>
-        <p:spPr/>
-        <p:txBody>
-          <a:bodyPr/>
-          <a:lstStyle/>
-          <a:p>
-            <a:endParaRPr lang="en-US" dirty="0"/>
-          </a:p>
-        </p:txBody>
-      </p:sp>
-      <p:sp>
-        <p:nvSpPr>
-          <p:cNvPr id="6" name="Content Placeholder 5">
-            <a:extLst>
-              <a:ext uri="{FF2B5EF4-FFF2-40B4-BE49-F238E27FC236}">
-                <a16:creationId xmlns:a16="http://schemas.microsoft.com/office/drawing/2014/main" id="{AC7C9880-8263-491D-A83E-0B934E6881C1}"/>
-              </a:ext>
-            </a:extLst>
-          </p:cNvPr>
-          <p:cNvSpPr>
-            <a:spLocks noGrp="1"/>
-          </p:cNvSpPr>
-          <p:nvPr>
-            <p:ph sz="quarter" idx="4"/>
-          </p:nvPr>
-        </p:nvSpPr>
-        <p:spPr/>
-        <p:txBody>
-          <a:bodyPr/>
-          <a:lstStyle/>
-          <a:p>
-            <a:endParaRPr lang="en-US"/>
+              <a:rPr lang="en-US" b="1" dirty="0" smtClean="0">
+                <a:latin typeface="Calibri" panose="020F0502020204030204" pitchFamily="34" charset="0"/>
+                <a:cs typeface="Calibri" panose="020F0502020204030204" pitchFamily="34" charset="0"/>
+              </a:rPr>
+              <a:t>introduction</a:t>
+            </a:r>
+            <a:endParaRPr lang="en-US" b="1" dirty="0">
+              <a:latin typeface="Calibri" panose="020F0502020204030204" pitchFamily="34" charset="0"/>
+              <a:cs typeface="Calibri" panose="020F0502020204030204" pitchFamily="34" charset="0"/>
+            </a:endParaRPr>
+          </a:p>
+        </p:txBody>
+      </p:sp>
+      <p:sp>
+        <p:nvSpPr>
+          <p:cNvPr id="3" name="Content Placeholder 2"/>
+          <p:cNvSpPr>
+            <a:spLocks noGrp="1"/>
+          </p:cNvSpPr>
+          <p:nvPr>
+            <p:ph idx="1"/>
+          </p:nvPr>
+        </p:nvSpPr>
+        <p:spPr>
+          <a:xfrm>
+            <a:off x="1014152" y="1770611"/>
+            <a:ext cx="10498975" cy="4106488"/>
+          </a:xfrm>
+        </p:spPr>
+        <p:txBody>
+          <a:bodyPr>
+            <a:noAutofit/>
+          </a:bodyPr>
+          <a:lstStyle/>
+          <a:p>
+            <a:r>
+              <a:rPr lang="en-US" sz="2400" dirty="0" smtClean="0">
+                <a:latin typeface="Calibri" panose="020F0502020204030204" pitchFamily="34" charset="0"/>
+                <a:cs typeface="Calibri" panose="020F0502020204030204" pitchFamily="34" charset="0"/>
+              </a:rPr>
+              <a:t>This is the final sprint for the third team project</a:t>
+            </a:r>
+          </a:p>
+          <a:p>
+            <a:r>
+              <a:rPr lang="en-US" sz="2400" dirty="0">
+                <a:latin typeface="Calibri" panose="020F0502020204030204" pitchFamily="34" charset="0"/>
+                <a:cs typeface="Calibri" panose="020F0502020204030204" pitchFamily="34" charset="0"/>
+              </a:rPr>
+              <a:t>We </a:t>
+            </a:r>
+            <a:r>
+              <a:rPr lang="en-US" sz="2400" dirty="0" smtClean="0">
+                <a:latin typeface="Calibri" panose="020F0502020204030204" pitchFamily="34" charset="0"/>
+                <a:cs typeface="Calibri" panose="020F0502020204030204" pitchFamily="34" charset="0"/>
+              </a:rPr>
+              <a:t>envisioned, designed and developed  </a:t>
+            </a:r>
+            <a:r>
+              <a:rPr lang="en-US" sz="2400" dirty="0">
+                <a:latin typeface="Calibri" panose="020F0502020204030204" pitchFamily="34" charset="0"/>
+                <a:cs typeface="Calibri" panose="020F0502020204030204" pitchFamily="34" charset="0"/>
+              </a:rPr>
+              <a:t>a Hotel Checking system (</a:t>
+            </a:r>
+            <a:r>
+              <a:rPr lang="en-US" sz="2400" dirty="0" smtClean="0">
+                <a:latin typeface="Calibri" panose="020F0502020204030204" pitchFamily="34" charset="0"/>
+                <a:cs typeface="Calibri" panose="020F0502020204030204" pitchFamily="34" charset="0"/>
+              </a:rPr>
+              <a:t>HCS)</a:t>
+            </a:r>
+          </a:p>
+          <a:p>
+            <a:r>
+              <a:rPr lang="en-US" sz="2400" dirty="0" smtClean="0">
+                <a:latin typeface="Calibri" panose="020F0502020204030204" pitchFamily="34" charset="0"/>
+                <a:cs typeface="Calibri" panose="020F0502020204030204" pitchFamily="34" charset="0"/>
+              </a:rPr>
+              <a:t>Hotel </a:t>
+            </a:r>
+            <a:r>
+              <a:rPr lang="en-US" sz="2400" dirty="0">
+                <a:latin typeface="Calibri" panose="020F0502020204030204" pitchFamily="34" charset="0"/>
+                <a:cs typeface="Calibri" panose="020F0502020204030204" pitchFamily="34" charset="0"/>
+              </a:rPr>
+              <a:t>employees </a:t>
+            </a:r>
+            <a:r>
+              <a:rPr lang="en-US" sz="2400" dirty="0" smtClean="0">
+                <a:latin typeface="Calibri" panose="020F0502020204030204" pitchFamily="34" charset="0"/>
+                <a:cs typeface="Calibri" panose="020F0502020204030204" pitchFamily="34" charset="0"/>
+              </a:rPr>
+              <a:t>may </a:t>
+            </a:r>
+            <a:r>
+              <a:rPr lang="en-US" sz="2400" dirty="0">
+                <a:latin typeface="Calibri" panose="020F0502020204030204" pitchFamily="34" charset="0"/>
+                <a:cs typeface="Calibri" panose="020F0502020204030204" pitchFamily="34" charset="0"/>
+              </a:rPr>
+              <a:t>use </a:t>
+            </a:r>
+            <a:r>
+              <a:rPr lang="en-US" sz="2400" dirty="0" smtClean="0">
+                <a:latin typeface="Calibri" panose="020F0502020204030204" pitchFamily="34" charset="0"/>
+                <a:cs typeface="Calibri" panose="020F0502020204030204" pitchFamily="34" charset="0"/>
+              </a:rPr>
+              <a:t>this system to </a:t>
+            </a:r>
+            <a:r>
+              <a:rPr lang="en-US" sz="2400" dirty="0">
+                <a:latin typeface="Calibri" panose="020F0502020204030204" pitchFamily="34" charset="0"/>
+                <a:cs typeface="Calibri" panose="020F0502020204030204" pitchFamily="34" charset="0"/>
+              </a:rPr>
+              <a:t>facilitate the check-in process of their guests, with membership-based priority. </a:t>
+            </a:r>
+            <a:endParaRPr lang="en-US" sz="2400" dirty="0" smtClean="0">
+              <a:latin typeface="Calibri" panose="020F0502020204030204" pitchFamily="34" charset="0"/>
+              <a:cs typeface="Calibri" panose="020F0502020204030204" pitchFamily="34" charset="0"/>
+            </a:endParaRPr>
+          </a:p>
+          <a:p>
+            <a:r>
+              <a:rPr lang="en-US" sz="2400" dirty="0" smtClean="0">
+                <a:latin typeface="Calibri" panose="020F0502020204030204" pitchFamily="34" charset="0"/>
+                <a:cs typeface="Calibri" panose="020F0502020204030204" pitchFamily="34" charset="0"/>
+              </a:rPr>
+              <a:t>This </a:t>
+            </a:r>
+            <a:r>
+              <a:rPr lang="en-US" sz="2400" dirty="0">
+                <a:latin typeface="Calibri" panose="020F0502020204030204" pitchFamily="34" charset="0"/>
+                <a:cs typeface="Calibri" panose="020F0502020204030204" pitchFamily="34" charset="0"/>
+              </a:rPr>
+              <a:t>system </a:t>
+            </a:r>
+            <a:r>
+              <a:rPr lang="en-US" sz="2400" dirty="0" smtClean="0">
+                <a:latin typeface="Calibri" panose="020F0502020204030204" pitchFamily="34" charset="0"/>
+                <a:cs typeface="Calibri" panose="020F0502020204030204" pitchFamily="34" charset="0"/>
+              </a:rPr>
+              <a:t>is flexible </a:t>
+            </a:r>
+            <a:r>
+              <a:rPr lang="en-US" sz="2400" dirty="0">
+                <a:latin typeface="Calibri" panose="020F0502020204030204" pitchFamily="34" charset="0"/>
+                <a:cs typeface="Calibri" panose="020F0502020204030204" pitchFamily="34" charset="0"/>
+              </a:rPr>
+              <a:t>to support varying business rules, a few user interface mechanisms (Front Desk, Housekeeping, and Reservation Services) and integration with third party systems </a:t>
+            </a:r>
+            <a:endParaRPr lang="en-US" sz="2400" dirty="0" smtClean="0">
+              <a:latin typeface="Calibri" panose="020F0502020204030204" pitchFamily="34" charset="0"/>
+              <a:cs typeface="Calibri" panose="020F0502020204030204" pitchFamily="34" charset="0"/>
+            </a:endParaRPr>
+          </a:p>
+          <a:p>
+            <a:r>
+              <a:rPr lang="en-US" sz="2400" dirty="0" smtClean="0"/>
+              <a:t>We followed </a:t>
+            </a:r>
+            <a:r>
+              <a:rPr lang="en-US" sz="2400" dirty="0"/>
+              <a:t>the Unified </a:t>
+            </a:r>
+            <a:r>
+              <a:rPr lang="en-US" sz="2400" dirty="0" smtClean="0"/>
+              <a:t>Process</a:t>
+            </a:r>
+            <a:endParaRPr lang="en-US" sz="2400" dirty="0"/>
           </a:p>
         </p:txBody>
       </p:sp>
     </p:spTree>
     <p:extLst>
       <p:ext uri="{BB962C8B-B14F-4D97-AF65-F5344CB8AC3E}">
-        <p14:creationId xmlns:p14="http://schemas.microsoft.com/office/powerpoint/2010/main" val="2536095298"/>
+        <p14:creationId xmlns:p14="http://schemas.microsoft.com/office/powerpoint/2010/main" val="1763931515"/>
       </p:ext>
     </p:extLst>
   </p:cSld>
@@ -3934,13 +4208,7 @@
       </p:grpSpPr>
       <p:sp>
         <p:nvSpPr>
-          <p:cNvPr id="2" name="Title 1">
-            <a:extLst>
-              <a:ext uri="{FF2B5EF4-FFF2-40B4-BE49-F238E27FC236}">
-                <a16:creationId xmlns:a16="http://schemas.microsoft.com/office/drawing/2014/main" id="{DD03F5F9-8AE9-45CC-BEC8-122C72924DA9}"/>
-              </a:ext>
-            </a:extLst>
-          </p:cNvPr>
+          <p:cNvPr id="2" name="Title 1"/>
           <p:cNvSpPr>
             <a:spLocks noGrp="1"/>
           </p:cNvSpPr>
@@ -3948,31 +4216,34 @@
             <p:ph type="title"/>
           </p:nvPr>
         </p:nvSpPr>
-        <p:spPr/>
-        <p:txBody>
-          <a:bodyPr/>
+        <p:spPr>
+          <a:xfrm>
+            <a:off x="1451579" y="447071"/>
+            <a:ext cx="9603275" cy="1049235"/>
+          </a:xfrm>
+        </p:spPr>
+        <p:txBody>
+          <a:bodyPr anchor="ctr"/>
           <a:lstStyle/>
           <a:p>
             <a:pPr algn="ctr"/>
             <a:r>
-              <a:rPr lang="en-US" b="1" dirty="0">
-                <a:latin typeface="Calibri" panose="020F0502020204030204" pitchFamily="34" charset="0"/>
-                <a:cs typeface="Calibri" panose="020F0502020204030204" pitchFamily="34" charset="0"/>
-              </a:rPr>
-              <a:t>Brief definition of Unified Process</a:t>
-            </a:r>
-          </a:p>
-        </p:txBody>
-      </p:sp>
-      <p:sp>
-        <p:nvSpPr>
-          <p:cNvPr id="3" name="Content Placeholder 2">
-            <a:extLst>
-              <a:ext uri="{FF2B5EF4-FFF2-40B4-BE49-F238E27FC236}">
-                <a16:creationId xmlns:a16="http://schemas.microsoft.com/office/drawing/2014/main" id="{2EEFF8C4-13AC-43B0-82D5-01E41A56059E}"/>
-              </a:ext>
-            </a:extLst>
-          </p:cNvPr>
+              <a:rPr lang="en-US" b="1" dirty="0" smtClean="0">
+                <a:latin typeface="Calibri" panose="020F0502020204030204" pitchFamily="34" charset="0"/>
+                <a:cs typeface="Calibri" panose="020F0502020204030204" pitchFamily="34" charset="0"/>
+              </a:rPr>
+              <a:t>Summary of system features</a:t>
+            </a:r>
+            <a:endParaRPr lang="en-US" b="1" dirty="0">
+              <a:latin typeface="Calibri" panose="020F0502020204030204" pitchFamily="34" charset="0"/>
+              <a:cs typeface="Calibri" panose="020F0502020204030204" pitchFamily="34" charset="0"/>
+            </a:endParaRPr>
+          </a:p>
+        </p:txBody>
+      </p:sp>
+      <p:sp>
+        <p:nvSpPr>
+          <p:cNvPr id="3" name="Content Placeholder 2"/>
           <p:cNvSpPr>
             <a:spLocks noGrp="1"/>
           </p:cNvSpPr>
@@ -3980,19 +4251,127 @@
             <p:ph idx="1"/>
           </p:nvPr>
         </p:nvSpPr>
-        <p:spPr/>
-        <p:txBody>
-          <a:bodyPr/>
-          <a:lstStyle/>
-          <a:p>
-            <a:endParaRPr lang="en-US" dirty="0"/>
+        <p:spPr>
+          <a:xfrm>
+            <a:off x="1451579" y="1812175"/>
+            <a:ext cx="9603275" cy="4073235"/>
+          </a:xfrm>
+        </p:spPr>
+        <p:txBody>
+          <a:bodyPr>
+            <a:noAutofit/>
+          </a:bodyPr>
+          <a:lstStyle/>
+          <a:p>
+            <a:r>
+              <a:rPr lang="en-US" sz="2400" dirty="0" smtClean="0">
+                <a:latin typeface="Calibri" panose="020F0502020204030204" pitchFamily="34" charset="0"/>
+                <a:cs typeface="Calibri" panose="020F0502020204030204" pitchFamily="34" charset="0"/>
+              </a:rPr>
+              <a:t>System designed for hotel </a:t>
+            </a:r>
+            <a:r>
+              <a:rPr lang="en-US" sz="2400" dirty="0">
+                <a:latin typeface="Calibri" panose="020F0502020204030204" pitchFamily="34" charset="0"/>
+                <a:cs typeface="Calibri" panose="020F0502020204030204" pitchFamily="34" charset="0"/>
+              </a:rPr>
+              <a:t>operations. </a:t>
+            </a:r>
+            <a:endParaRPr lang="en-US" sz="2400" dirty="0" smtClean="0">
+              <a:latin typeface="Calibri" panose="020F0502020204030204" pitchFamily="34" charset="0"/>
+              <a:cs typeface="Calibri" panose="020F0502020204030204" pitchFamily="34" charset="0"/>
+            </a:endParaRPr>
+          </a:p>
+          <a:p>
+            <a:r>
+              <a:rPr lang="en-US" sz="2400" dirty="0" smtClean="0">
+                <a:latin typeface="Calibri" panose="020F0502020204030204" pitchFamily="34" charset="0"/>
+                <a:cs typeface="Calibri" panose="020F0502020204030204" pitchFamily="34" charset="0"/>
+              </a:rPr>
+              <a:t>Guests </a:t>
+            </a:r>
+            <a:r>
+              <a:rPr lang="en-US" sz="2400" dirty="0">
+                <a:latin typeface="Calibri" panose="020F0502020204030204" pitchFamily="34" charset="0"/>
+                <a:cs typeface="Calibri" panose="020F0502020204030204" pitchFamily="34" charset="0"/>
+              </a:rPr>
+              <a:t>will be checked in by the </a:t>
+            </a:r>
+            <a:r>
+              <a:rPr lang="en-US" sz="2400" dirty="0" err="1">
+                <a:latin typeface="Calibri" panose="020F0502020204030204" pitchFamily="34" charset="0"/>
+                <a:cs typeface="Calibri" panose="020F0502020204030204" pitchFamily="34" charset="0"/>
+              </a:rPr>
+              <a:t>FrontDesk</a:t>
+            </a:r>
+            <a:r>
+              <a:rPr lang="en-US" sz="2400" dirty="0">
+                <a:latin typeface="Calibri" panose="020F0502020204030204" pitchFamily="34" charset="0"/>
+                <a:cs typeface="Calibri" panose="020F0502020204030204" pitchFamily="34" charset="0"/>
+              </a:rPr>
+              <a:t>  (worker) who will coordinate with housekeeping  (worker) to insure the rooms are </a:t>
+            </a:r>
+            <a:r>
+              <a:rPr lang="en-US" sz="2400" dirty="0" smtClean="0">
+                <a:latin typeface="Calibri" panose="020F0502020204030204" pitchFamily="34" charset="0"/>
+                <a:cs typeface="Calibri" panose="020F0502020204030204" pitchFamily="34" charset="0"/>
+              </a:rPr>
+              <a:t>cleaned </a:t>
+            </a:r>
+            <a:r>
+              <a:rPr lang="en-US" sz="2400" dirty="0">
+                <a:latin typeface="Calibri" panose="020F0502020204030204" pitchFamily="34" charset="0"/>
+                <a:cs typeface="Calibri" panose="020F0502020204030204" pitchFamily="34" charset="0"/>
+              </a:rPr>
+              <a:t>and ready for occupancy through the </a:t>
+            </a:r>
+            <a:r>
+              <a:rPr lang="en-US" sz="2400" dirty="0" smtClean="0">
+                <a:latin typeface="Calibri" panose="020F0502020204030204" pitchFamily="34" charset="0"/>
+                <a:cs typeface="Calibri" panose="020F0502020204030204" pitchFamily="34" charset="0"/>
+              </a:rPr>
+              <a:t>system.</a:t>
+            </a:r>
+          </a:p>
+          <a:p>
+            <a:r>
+              <a:rPr lang="en-US" sz="2400" dirty="0" err="1" smtClean="0">
+                <a:latin typeface="Calibri" panose="020F0502020204030204" pitchFamily="34" charset="0"/>
+                <a:cs typeface="Calibri" panose="020F0502020204030204" pitchFamily="34" charset="0"/>
+              </a:rPr>
+              <a:t>RoomService</a:t>
+            </a:r>
+            <a:r>
+              <a:rPr lang="en-US" sz="2400" dirty="0" smtClean="0">
+                <a:latin typeface="Calibri" panose="020F0502020204030204" pitchFamily="34" charset="0"/>
+                <a:cs typeface="Calibri" panose="020F0502020204030204" pitchFamily="34" charset="0"/>
+              </a:rPr>
+              <a:t> </a:t>
+            </a:r>
+            <a:r>
+              <a:rPr lang="en-US" sz="2400" dirty="0">
+                <a:latin typeface="Calibri" panose="020F0502020204030204" pitchFamily="34" charset="0"/>
+                <a:cs typeface="Calibri" panose="020F0502020204030204" pitchFamily="34" charset="0"/>
+              </a:rPr>
+              <a:t>will check minibar in room and enters minibar status in system as well. </a:t>
+            </a:r>
+            <a:endParaRPr lang="en-US" sz="2400" dirty="0" smtClean="0">
+              <a:latin typeface="Calibri" panose="020F0502020204030204" pitchFamily="34" charset="0"/>
+              <a:cs typeface="Calibri" panose="020F0502020204030204" pitchFamily="34" charset="0"/>
+            </a:endParaRPr>
+          </a:p>
+          <a:p>
+            <a:endParaRPr lang="en-US" sz="2400" dirty="0">
+              <a:latin typeface="Calibri" panose="020F0502020204030204" pitchFamily="34" charset="0"/>
+              <a:cs typeface="Calibri" panose="020F0502020204030204" pitchFamily="34" charset="0"/>
+            </a:endParaRPr>
           </a:p>
         </p:txBody>
       </p:sp>
     </p:spTree>
     <p:extLst>
       <p:ext uri="{BB962C8B-B14F-4D97-AF65-F5344CB8AC3E}">
-        <p14:creationId xmlns:p14="http://schemas.microsoft.com/office/powerpoint/2010/main" val="939974827"/>
+        <p14:creationId xmlns:p14="http://schemas.microsoft.com/office/powerpoint/2010/main" val="206998920"/>
       </p:ext>
     </p:extLst>
   </p:cSld>
@@ -4021,13 +4400,7 @@
       </p:grpSpPr>
       <p:sp>
         <p:nvSpPr>
-          <p:cNvPr id="2" name="Title 1">
-            <a:extLst>
-              <a:ext uri="{FF2B5EF4-FFF2-40B4-BE49-F238E27FC236}">
-                <a16:creationId xmlns:a16="http://schemas.microsoft.com/office/drawing/2014/main" id="{438099E4-6D33-4F30-A43E-55ED91E1D623}"/>
-              </a:ext>
-            </a:extLst>
-          </p:cNvPr>
+          <p:cNvPr id="2" name="Title 1"/>
           <p:cNvSpPr>
             <a:spLocks noGrp="1"/>
           </p:cNvSpPr>
@@ -4035,76 +4408,158 @@
             <p:ph type="title"/>
           </p:nvPr>
         </p:nvSpPr>
-        <p:spPr/>
-        <p:txBody>
-          <a:bodyPr/>
+        <p:spPr>
+          <a:xfrm>
+            <a:off x="1451578" y="405508"/>
+            <a:ext cx="9603275" cy="1049235"/>
+          </a:xfrm>
+        </p:spPr>
+        <p:txBody>
+          <a:bodyPr anchor="ctr"/>
           <a:lstStyle/>
           <a:p>
             <a:pPr algn="ctr"/>
             <a:r>
-              <a:rPr lang="en-US" b="1" dirty="0">
-                <a:latin typeface="Calibri" panose="020F0502020204030204" pitchFamily="34" charset="0"/>
-                <a:cs typeface="Calibri" panose="020F0502020204030204" pitchFamily="34" charset="0"/>
-              </a:rPr>
-              <a:t>Central Use case 1</a:t>
-            </a:r>
-          </a:p>
-        </p:txBody>
-      </p:sp>
-      <p:sp>
-        <p:nvSpPr>
-          <p:cNvPr id="3" name="Content Placeholder 2">
-            <a:extLst>
-              <a:ext uri="{FF2B5EF4-FFF2-40B4-BE49-F238E27FC236}">
-                <a16:creationId xmlns:a16="http://schemas.microsoft.com/office/drawing/2014/main" id="{977B9898-47C2-40D3-A08D-837CFDB57D26}"/>
-              </a:ext>
-            </a:extLst>
-          </p:cNvPr>
-          <p:cNvSpPr>
-            <a:spLocks noGrp="1"/>
-          </p:cNvSpPr>
-          <p:nvPr>
-            <p:ph sz="half" idx="1"/>
-          </p:nvPr>
-        </p:nvSpPr>
-        <p:spPr/>
-        <p:txBody>
-          <a:bodyPr/>
-          <a:lstStyle/>
-          <a:p>
-            <a:endParaRPr lang="en-US"/>
-          </a:p>
-        </p:txBody>
-      </p:sp>
-      <p:sp>
-        <p:nvSpPr>
-          <p:cNvPr id="4" name="Content Placeholder 3">
-            <a:extLst>
-              <a:ext uri="{FF2B5EF4-FFF2-40B4-BE49-F238E27FC236}">
-                <a16:creationId xmlns:a16="http://schemas.microsoft.com/office/drawing/2014/main" id="{BED3BABA-D58F-4511-9BCF-FD84EEB6AB0C}"/>
-              </a:ext>
-            </a:extLst>
-          </p:cNvPr>
-          <p:cNvSpPr>
-            <a:spLocks noGrp="1"/>
-          </p:cNvSpPr>
-          <p:nvPr>
-            <p:ph sz="half" idx="2"/>
-          </p:nvPr>
-        </p:nvSpPr>
-        <p:spPr/>
-        <p:txBody>
-          <a:bodyPr/>
-          <a:lstStyle/>
-          <a:p>
-            <a:endParaRPr lang="en-US"/>
+              <a:rPr lang="en-US" b="1" dirty="0" smtClean="0">
+                <a:latin typeface="Calibri" panose="020F0502020204030204" pitchFamily="34" charset="0"/>
+                <a:cs typeface="Calibri" panose="020F0502020204030204" pitchFamily="34" charset="0"/>
+              </a:rPr>
+              <a:t>Summary of system features</a:t>
+            </a:r>
+            <a:endParaRPr lang="en-US" b="1" dirty="0">
+              <a:latin typeface="Calibri" panose="020F0502020204030204" pitchFamily="34" charset="0"/>
+              <a:cs typeface="Calibri" panose="020F0502020204030204" pitchFamily="34" charset="0"/>
+            </a:endParaRPr>
+          </a:p>
+        </p:txBody>
+      </p:sp>
+      <p:sp>
+        <p:nvSpPr>
+          <p:cNvPr id="3" name="Content Placeholder 2"/>
+          <p:cNvSpPr>
+            <a:spLocks noGrp="1"/>
+          </p:cNvSpPr>
+          <p:nvPr>
+            <p:ph idx="1"/>
+          </p:nvPr>
+        </p:nvSpPr>
+        <p:spPr>
+          <a:xfrm>
+            <a:off x="1039091" y="2015732"/>
+            <a:ext cx="10291156" cy="3653548"/>
+          </a:xfrm>
+        </p:spPr>
+        <p:txBody>
+          <a:bodyPr>
+            <a:normAutofit lnSpcReduction="10000"/>
+          </a:bodyPr>
+          <a:lstStyle/>
+          <a:p>
+            <a:r>
+              <a:rPr lang="en-US" sz="2400" dirty="0">
+                <a:latin typeface="Calibri" panose="020F0502020204030204" pitchFamily="34" charset="0"/>
+                <a:cs typeface="Calibri" panose="020F0502020204030204" pitchFamily="34" charset="0"/>
+              </a:rPr>
+              <a:t>Once rooms are clean and minibar restocked, </a:t>
+            </a:r>
+            <a:r>
+              <a:rPr lang="en-US" sz="2400" dirty="0" err="1">
+                <a:latin typeface="Calibri" panose="020F0502020204030204" pitchFamily="34" charset="0"/>
+                <a:cs typeface="Calibri" panose="020F0502020204030204" pitchFamily="34" charset="0"/>
+              </a:rPr>
+              <a:t>FrontDesk</a:t>
+            </a:r>
+            <a:r>
+              <a:rPr lang="en-US" sz="2400" dirty="0">
+                <a:latin typeface="Calibri" panose="020F0502020204030204" pitchFamily="34" charset="0"/>
+                <a:cs typeface="Calibri" panose="020F0502020204030204" pitchFamily="34" charset="0"/>
+              </a:rPr>
+              <a:t> will check each Guest club-status (gold, silver or none- member) and assign rooms by priority. </a:t>
+            </a:r>
+          </a:p>
+          <a:p>
+            <a:r>
+              <a:rPr lang="en-US" sz="2400" dirty="0">
+                <a:latin typeface="Calibri" panose="020F0502020204030204" pitchFamily="34" charset="0"/>
+                <a:cs typeface="Calibri" panose="020F0502020204030204" pitchFamily="34" charset="0"/>
+              </a:rPr>
+              <a:t>If the room is not clean the Guest will have to wait based on priority status. There will be interactions between the &lt;&lt;Patrons&gt;&gt; &lt;&lt;</a:t>
+            </a:r>
+            <a:r>
+              <a:rPr lang="en-US" sz="2400" dirty="0" err="1">
+                <a:latin typeface="Calibri" panose="020F0502020204030204" pitchFamily="34" charset="0"/>
+                <a:cs typeface="Calibri" panose="020F0502020204030204" pitchFamily="34" charset="0"/>
+              </a:rPr>
+              <a:t>FrontDesk</a:t>
+            </a:r>
+            <a:r>
+              <a:rPr lang="en-US" sz="2400" dirty="0">
+                <a:latin typeface="Calibri" panose="020F0502020204030204" pitchFamily="34" charset="0"/>
+                <a:cs typeface="Calibri" panose="020F0502020204030204" pitchFamily="34" charset="0"/>
+              </a:rPr>
+              <a:t>&gt;&gt; &lt;&lt;</a:t>
+            </a:r>
+            <a:r>
+              <a:rPr lang="en-US" sz="2400" dirty="0" err="1">
+                <a:latin typeface="Calibri" panose="020F0502020204030204" pitchFamily="34" charset="0"/>
+                <a:cs typeface="Calibri" panose="020F0502020204030204" pitchFamily="34" charset="0"/>
+              </a:rPr>
+              <a:t>RoomService</a:t>
+            </a:r>
+            <a:r>
+              <a:rPr lang="en-US" sz="2400" dirty="0">
+                <a:latin typeface="Calibri" panose="020F0502020204030204" pitchFamily="34" charset="0"/>
+                <a:cs typeface="Calibri" panose="020F0502020204030204" pitchFamily="34" charset="0"/>
+              </a:rPr>
+              <a:t>&gt;&gt;and &lt;&lt;housekeeping&gt;&gt;. </a:t>
+            </a:r>
+          </a:p>
+          <a:p>
+            <a:r>
+              <a:rPr lang="en-US" sz="2400" dirty="0">
+                <a:latin typeface="Calibri" panose="020F0502020204030204" pitchFamily="34" charset="0"/>
+                <a:cs typeface="Calibri" panose="020F0502020204030204" pitchFamily="34" charset="0"/>
+              </a:rPr>
+              <a:t>There is also interface so that each of the users &lt;&lt;Patron&gt;&gt; &lt;&lt;</a:t>
+            </a:r>
+            <a:r>
+              <a:rPr lang="en-US" sz="2400" dirty="0" err="1">
+                <a:latin typeface="Calibri" panose="020F0502020204030204" pitchFamily="34" charset="0"/>
+                <a:cs typeface="Calibri" panose="020F0502020204030204" pitchFamily="34" charset="0"/>
+              </a:rPr>
+              <a:t>FrontDesk</a:t>
+            </a:r>
+            <a:r>
+              <a:rPr lang="en-US" sz="2400" dirty="0">
+                <a:latin typeface="Calibri" panose="020F0502020204030204" pitchFamily="34" charset="0"/>
+                <a:cs typeface="Calibri" panose="020F0502020204030204" pitchFamily="34" charset="0"/>
+              </a:rPr>
+              <a:t>&gt;&gt; &lt;&lt;</a:t>
+            </a:r>
+            <a:r>
+              <a:rPr lang="en-US" sz="2400" dirty="0" err="1">
+                <a:latin typeface="Calibri" panose="020F0502020204030204" pitchFamily="34" charset="0"/>
+                <a:cs typeface="Calibri" panose="020F0502020204030204" pitchFamily="34" charset="0"/>
+              </a:rPr>
+              <a:t>RoomService</a:t>
+            </a:r>
+            <a:r>
+              <a:rPr lang="en-US" sz="2400" dirty="0">
+                <a:latin typeface="Calibri" panose="020F0502020204030204" pitchFamily="34" charset="0"/>
+                <a:cs typeface="Calibri" panose="020F0502020204030204" pitchFamily="34" charset="0"/>
+              </a:rPr>
+              <a:t>&gt;&gt;and &lt;&lt;housekeeping&gt;&gt; may interact with each other the system as well</a:t>
+            </a:r>
+          </a:p>
+          <a:p>
+            <a:endParaRPr lang="en-US" dirty="0"/>
           </a:p>
         </p:txBody>
       </p:sp>
     </p:spTree>
     <p:extLst>
       <p:ext uri="{BB962C8B-B14F-4D97-AF65-F5344CB8AC3E}">
-        <p14:creationId xmlns:p14="http://schemas.microsoft.com/office/powerpoint/2010/main" val="977325495"/>
+        <p14:creationId xmlns:p14="http://schemas.microsoft.com/office/powerpoint/2010/main" val="2672887517"/>
       </p:ext>
     </p:extLst>
   </p:cSld>
@@ -4136,7 +4591,7 @@
           <p:cNvPr id="2" name="Title 1">
             <a:extLst>
               <a:ext uri="{FF2B5EF4-FFF2-40B4-BE49-F238E27FC236}">
-                <a16:creationId xmlns:a16="http://schemas.microsoft.com/office/drawing/2014/main" id="{2E38AF38-5AC7-4CFA-8ADB-0607A519C6AB}"/>
+                <a16:creationId xmlns:a16="http://schemas.microsoft.com/office/drawing/2014/main" id="{438099E4-6D33-4F30-A43E-55ED91E1D623}"/>
               </a:ext>
             </a:extLst>
           </p:cNvPr>
@@ -4160,7 +4615,6 @@
               </a:rPr>
               <a:t>Central Use case 1</a:t>
             </a:r>
-            <a:endParaRPr lang="en-US" dirty="0"/>
           </a:p>
         </p:txBody>
       </p:sp>
@@ -4169,7 +4623,7 @@
           <p:cNvPr id="3" name="Content Placeholder 2">
             <a:extLst>
               <a:ext uri="{FF2B5EF4-FFF2-40B4-BE49-F238E27FC236}">
-                <a16:creationId xmlns:a16="http://schemas.microsoft.com/office/drawing/2014/main" id="{4F1639CC-5566-4F0E-893A-758DDFCE7C01}"/>
+                <a16:creationId xmlns:a16="http://schemas.microsoft.com/office/drawing/2014/main" id="{977B9898-47C2-40D3-A08D-837CFDB57D26}"/>
               </a:ext>
             </a:extLst>
           </p:cNvPr>
@@ -4180,12 +4634,89 @@
             <p:ph sz="half" idx="1"/>
           </p:nvPr>
         </p:nvSpPr>
-        <p:spPr/>
-        <p:txBody>
-          <a:bodyPr/>
-          <a:lstStyle/>
-          <a:p>
-            <a:endParaRPr lang="en-US"/>
+        <p:spPr>
+          <a:xfrm>
+            <a:off x="548640" y="2010878"/>
+            <a:ext cx="5543843" cy="3658402"/>
+          </a:xfrm>
+        </p:spPr>
+        <p:txBody>
+          <a:bodyPr>
+            <a:normAutofit fontScale="25000" lnSpcReduction="20000"/>
+          </a:bodyPr>
+          <a:lstStyle/>
+          <a:p>
+            <a:r>
+              <a:rPr lang="en-US" sz="5600" dirty="0"/>
+              <a:t>HCIR: Patron Check In Room</a:t>
+            </a:r>
+          </a:p>
+          <a:p>
+            <a:r>
+              <a:rPr lang="en-US" sz="5600" b="1" dirty="0"/>
+              <a:t>Scope:</a:t>
+            </a:r>
+            <a:r>
+              <a:rPr lang="en-US" sz="5600" dirty="0"/>
+              <a:t> Hotel reservations: Check-In Patron.</a:t>
+            </a:r>
+          </a:p>
+          <a:p>
+            <a:r>
+              <a:rPr lang="en-US" sz="5600" dirty="0"/>
+              <a:t> </a:t>
+            </a:r>
+          </a:p>
+          <a:p>
+            <a:r>
+              <a:rPr lang="en-US" sz="5600" b="1" dirty="0"/>
+              <a:t>Level:</a:t>
+            </a:r>
+            <a:r>
+              <a:rPr lang="en-US" sz="5600" dirty="0"/>
+              <a:t> User Goal</a:t>
+            </a:r>
+          </a:p>
+          <a:p>
+            <a:r>
+              <a:rPr lang="en-US" sz="5600" b="1" dirty="0"/>
+              <a:t>Primary Actor</a:t>
+            </a:r>
+            <a:r>
+              <a:rPr lang="en-US" sz="5600" dirty="0"/>
+              <a:t>: </a:t>
+            </a:r>
+            <a:r>
+              <a:rPr lang="en-US" sz="5600" dirty="0" err="1"/>
+              <a:t>FrontDest</a:t>
+            </a:r>
+            <a:endParaRPr lang="en-US" sz="5600" dirty="0"/>
+          </a:p>
+          <a:p>
+            <a:pPr marL="0" indent="0">
+              <a:buNone/>
+            </a:pPr>
+            <a:endParaRPr lang="en-US" sz="5600" dirty="0"/>
+          </a:p>
+          <a:p>
+            <a:r>
+              <a:rPr lang="en-US" sz="5600" b="1" dirty="0"/>
+              <a:t>Preconditions:</a:t>
+            </a:r>
+            <a:endParaRPr lang="en-US" sz="5600" dirty="0"/>
+          </a:p>
+          <a:p>
+            <a:r>
+              <a:rPr lang="en-US" sz="5600" dirty="0" err="1"/>
+              <a:t>FrontDesk</a:t>
+            </a:r>
+            <a:r>
+              <a:rPr lang="en-US" sz="5600" dirty="0"/>
+              <a:t> has logged in to the System. Patron must have confirmation number after previously reserving online. System has  Patron’s reservation already stored in with name and confirmation number. Rooms must be clean and minibar must be restocked. Also the Patron must have priority status. </a:t>
+            </a:r>
+          </a:p>
+          <a:p>
+            <a:endParaRPr lang="en-US" dirty="0"/>
           </a:p>
         </p:txBody>
       </p:sp>
@@ -4194,7 +4725,7 @@
           <p:cNvPr id="4" name="Content Placeholder 3">
             <a:extLst>
               <a:ext uri="{FF2B5EF4-FFF2-40B4-BE49-F238E27FC236}">
-                <a16:creationId xmlns:a16="http://schemas.microsoft.com/office/drawing/2014/main" id="{3BD21213-64B4-48BA-A5A3-A6C850D71D30}"/>
+                <a16:creationId xmlns:a16="http://schemas.microsoft.com/office/drawing/2014/main" id="{BED3BABA-D58F-4511-9BCF-FD84EEB6AB0C}"/>
               </a:ext>
             </a:extLst>
           </p:cNvPr>
@@ -4205,19 +4736,62 @@
             <p:ph sz="half" idx="2"/>
           </p:nvPr>
         </p:nvSpPr>
-        <p:spPr/>
-        <p:txBody>
-          <a:bodyPr/>
-          <a:lstStyle/>
-          <a:p>
-            <a:endParaRPr lang="en-US"/>
+        <p:spPr>
+          <a:xfrm>
+            <a:off x="6252034" y="1858024"/>
+            <a:ext cx="5444836" cy="3441520"/>
+          </a:xfrm>
+        </p:spPr>
+        <p:txBody>
+          <a:bodyPr>
+            <a:noAutofit/>
+          </a:bodyPr>
+          <a:lstStyle/>
+          <a:p>
+            <a:r>
+              <a:rPr lang="en-US" sz="1400" b="1" dirty="0"/>
+              <a:t>Success Guarantee (Post Condition)</a:t>
+            </a:r>
+            <a:r>
+              <a:rPr lang="en-US" sz="1400" dirty="0"/>
+              <a:t>:</a:t>
+            </a:r>
+          </a:p>
+          <a:p>
+            <a:r>
+              <a:rPr lang="en-US" sz="1400" dirty="0"/>
+              <a:t>Patron has a reservation already in the system and a confirmation number. Room is Vacant, clean and Minibar is restocked. Priority by membership is honored</a:t>
+            </a:r>
+            <a:r>
+              <a:rPr lang="en-US" sz="1400" dirty="0" smtClean="0"/>
+              <a:t>.</a:t>
+            </a:r>
+            <a:r>
+              <a:rPr lang="en-US" sz="1400" dirty="0"/>
+              <a:t> </a:t>
+            </a:r>
+          </a:p>
+          <a:p>
+            <a:pPr marL="0" indent="0">
+              <a:buNone/>
+            </a:pPr>
+            <a:endParaRPr lang="en-US" sz="1400" dirty="0"/>
+          </a:p>
+          <a:p>
+            <a:r>
+              <a:rPr lang="en-US" sz="1400" dirty="0"/>
+              <a:t> </a:t>
+            </a:r>
+          </a:p>
+          <a:p>
+            <a:endParaRPr lang="en-US" sz="1400" dirty="0"/>
           </a:p>
         </p:txBody>
       </p:sp>
     </p:spTree>
     <p:extLst>
       <p:ext uri="{BB962C8B-B14F-4D97-AF65-F5344CB8AC3E}">
-        <p14:creationId xmlns:p14="http://schemas.microsoft.com/office/powerpoint/2010/main" val="4216272235"/>
+        <p14:creationId xmlns:p14="http://schemas.microsoft.com/office/powerpoint/2010/main" val="977325495"/>
       </p:ext>
     </p:extLst>
   </p:cSld>
@@ -4249,7 +4823,7 @@
           <p:cNvPr id="2" name="Title 1">
             <a:extLst>
               <a:ext uri="{FF2B5EF4-FFF2-40B4-BE49-F238E27FC236}">
-                <a16:creationId xmlns:a16="http://schemas.microsoft.com/office/drawing/2014/main" id="{ED8B118C-ED4D-45CD-81B1-569534F4634A}"/>
+                <a16:creationId xmlns:a16="http://schemas.microsoft.com/office/drawing/2014/main" id="{2E38AF38-5AC7-4CFA-8ADB-0607A519C6AB}"/>
               </a:ext>
             </a:extLst>
           </p:cNvPr>
@@ -4271,8 +4845,9 @@
                 <a:latin typeface="Calibri" panose="020F0502020204030204" pitchFamily="34" charset="0"/>
                 <a:cs typeface="Calibri" panose="020F0502020204030204" pitchFamily="34" charset="0"/>
               </a:rPr>
-              <a:t>System Sequence diagram </a:t>
-            </a:r>
+              <a:t>Central Use case 1</a:t>
+            </a:r>
+            <a:endParaRPr lang="en-US" dirty="0"/>
           </a:p>
         </p:txBody>
       </p:sp>
@@ -4281,7 +4856,7 @@
           <p:cNvPr id="3" name="Content Placeholder 2">
             <a:extLst>
               <a:ext uri="{FF2B5EF4-FFF2-40B4-BE49-F238E27FC236}">
-                <a16:creationId xmlns:a16="http://schemas.microsoft.com/office/drawing/2014/main" id="{7C39B00A-AB72-4B7A-ABC6-BDF48DFADE1E}"/>
+                <a16:creationId xmlns:a16="http://schemas.microsoft.com/office/drawing/2014/main" id="{4F1639CC-5566-4F0E-893A-758DDFCE7C01}"/>
               </a:ext>
             </a:extLst>
           </p:cNvPr>
@@ -4292,12 +4867,83 @@
             <p:ph sz="half" idx="1"/>
           </p:nvPr>
         </p:nvSpPr>
-        <p:spPr/>
-        <p:txBody>
-          <a:bodyPr/>
-          <a:lstStyle/>
-          <a:p>
-            <a:endParaRPr lang="en-US"/>
+        <p:spPr>
+          <a:xfrm>
+            <a:off x="507076" y="2010878"/>
+            <a:ext cx="5585407" cy="3448595"/>
+          </a:xfrm>
+        </p:spPr>
+        <p:txBody>
+          <a:bodyPr>
+            <a:noAutofit/>
+          </a:bodyPr>
+          <a:lstStyle/>
+          <a:p>
+            <a:r>
+              <a:rPr lang="en-US" sz="1800" dirty="0"/>
+              <a:t>UCOR: Patron Check Out Room</a:t>
+            </a:r>
+          </a:p>
+          <a:p>
+            <a:r>
+              <a:rPr lang="en-US" sz="1800" b="1" dirty="0"/>
+              <a:t>Scope</a:t>
+            </a:r>
+            <a:r>
+              <a:rPr lang="en-US" sz="1800" dirty="0"/>
+              <a:t>: Hotel reservations: Check-Out Patron.</a:t>
+            </a:r>
+          </a:p>
+          <a:p>
+            <a:r>
+              <a:rPr lang="en-US" sz="1800" b="1" dirty="0"/>
+              <a:t>Level</a:t>
+            </a:r>
+            <a:r>
+              <a:rPr lang="en-US" sz="1800" dirty="0"/>
+              <a:t>: User Goal</a:t>
+            </a:r>
+          </a:p>
+          <a:p>
+            <a:r>
+              <a:rPr lang="en-US" sz="1800" b="1" dirty="0"/>
+              <a:t>Primary Actor</a:t>
+            </a:r>
+            <a:r>
+              <a:rPr lang="en-US" sz="1800" dirty="0"/>
+              <a:t>: Patron</a:t>
+            </a:r>
+          </a:p>
+          <a:p>
+            <a:r>
+              <a:rPr lang="en-US" sz="1800" b="1" dirty="0"/>
+              <a:t>Preconditions</a:t>
+            </a:r>
+            <a:r>
+              <a:rPr lang="en-US" sz="1800" dirty="0"/>
+              <a:t>:</a:t>
+            </a:r>
+          </a:p>
+          <a:p>
+            <a:r>
+              <a:rPr lang="en-US" sz="1800" dirty="0" err="1"/>
+              <a:t>HouseKeeping</a:t>
+            </a:r>
+            <a:r>
+              <a:rPr lang="en-US" sz="1800" dirty="0"/>
+              <a:t> Checks if Room is occupied. </a:t>
+            </a:r>
+            <a:r>
+              <a:rPr lang="en-US" sz="1800" dirty="0" err="1"/>
+              <a:t>FrontDesk</a:t>
+            </a:r>
+            <a:r>
+              <a:rPr lang="en-US" sz="1800" dirty="0"/>
+              <a:t> Logs into system to check if room is occupied. Patron must leave room or will be charged for another night.</a:t>
+            </a:r>
+          </a:p>
+          <a:p>
+            <a:endParaRPr lang="en-US" sz="1800" dirty="0"/>
           </a:p>
         </p:txBody>
       </p:sp>
@@ -4306,7 +4952,7 @@
           <p:cNvPr id="4" name="Content Placeholder 3">
             <a:extLst>
               <a:ext uri="{FF2B5EF4-FFF2-40B4-BE49-F238E27FC236}">
-                <a16:creationId xmlns:a16="http://schemas.microsoft.com/office/drawing/2014/main" id="{B1B98F97-D802-4F60-A6C2-9F50DE1A03CB}"/>
+                <a16:creationId xmlns:a16="http://schemas.microsoft.com/office/drawing/2014/main" id="{3BD21213-64B4-48BA-A5A3-A6C850D71D30}"/>
               </a:ext>
             </a:extLst>
           </p:cNvPr>
@@ -4317,19 +4963,169 @@
             <p:ph sz="half" idx="2"/>
           </p:nvPr>
         </p:nvSpPr>
-        <p:spPr/>
-        <p:txBody>
-          <a:bodyPr/>
-          <a:lstStyle/>
-          <a:p>
-            <a:endParaRPr lang="en-US"/>
+        <p:spPr>
+          <a:xfrm>
+            <a:off x="5827222" y="1849712"/>
+            <a:ext cx="6517178" cy="3818192"/>
+          </a:xfrm>
+        </p:spPr>
+        <p:txBody>
+          <a:bodyPr>
+            <a:noAutofit/>
+          </a:bodyPr>
+          <a:lstStyle/>
+          <a:p>
+            <a:r>
+              <a:rPr lang="en-US" sz="1400" b="1" dirty="0"/>
+              <a:t>Success Guarantee (Post Condition):</a:t>
+            </a:r>
+            <a:endParaRPr lang="en-US" sz="1400" dirty="0"/>
+          </a:p>
+          <a:p>
+            <a:r>
+              <a:rPr lang="en-US" sz="1400" dirty="0"/>
+              <a:t>Patron is out of room and checked out with front desk. </a:t>
+            </a:r>
+            <a:r>
+              <a:rPr lang="en-US" sz="1400" dirty="0" err="1"/>
+              <a:t>MiniBar</a:t>
+            </a:r>
+            <a:r>
+              <a:rPr lang="en-US" sz="1400" dirty="0"/>
+              <a:t> is restocked and </a:t>
+            </a:r>
+            <a:r>
+              <a:rPr lang="en-US" sz="1400" dirty="0" smtClean="0"/>
+              <a:t>  </a:t>
+            </a:r>
+            <a:r>
+              <a:rPr lang="en-US" sz="1400" dirty="0"/>
+              <a:t>rooms are vacant and clean. All </a:t>
+            </a:r>
+            <a:r>
+              <a:rPr lang="en-US" sz="1400" dirty="0" err="1"/>
+              <a:t>MiniBar</a:t>
+            </a:r>
+            <a:r>
+              <a:rPr lang="en-US" sz="1400" dirty="0"/>
+              <a:t> restocking fees are paid</a:t>
+            </a:r>
+            <a:r>
+              <a:rPr lang="en-US" sz="1400" dirty="0" smtClean="0"/>
+              <a:t>.</a:t>
+            </a:r>
+            <a:r>
+              <a:rPr lang="en-US" sz="1400" dirty="0"/>
+              <a:t> </a:t>
+            </a:r>
+          </a:p>
+          <a:p>
+            <a:pPr marL="0" indent="0">
+              <a:buNone/>
+            </a:pPr>
+            <a:r>
+              <a:rPr lang="en-US" sz="1400" b="1" dirty="0"/>
+              <a:t>Main Success Scenario (Basic Flow):</a:t>
+            </a:r>
+            <a:endParaRPr lang="en-US" sz="1400" dirty="0"/>
+          </a:p>
+          <a:p>
+            <a:pPr lvl="0"/>
+            <a:r>
+              <a:rPr lang="en-US" sz="1400" dirty="0"/>
+              <a:t>Patron leaves the room.</a:t>
+            </a:r>
+          </a:p>
+          <a:p>
+            <a:pPr lvl="0"/>
+            <a:r>
+              <a:rPr lang="en-US" sz="1400" dirty="0" err="1"/>
+              <a:t>HouseKeeping</a:t>
+            </a:r>
+            <a:r>
+              <a:rPr lang="en-US" sz="1400" dirty="0"/>
+              <a:t> checks room occupancy.</a:t>
+            </a:r>
+          </a:p>
+          <a:p>
+            <a:pPr lvl="0"/>
+            <a:r>
+              <a:rPr lang="en-US" sz="1400" dirty="0" err="1"/>
+              <a:t>HouseKeeping</a:t>
+            </a:r>
+            <a:r>
+              <a:rPr lang="en-US" sz="1400" dirty="0"/>
+              <a:t> marks the room as Vacant Dirty (VD) in system once patron leaves.</a:t>
+            </a:r>
+          </a:p>
+          <a:p>
+            <a:pPr lvl="0"/>
+            <a:r>
+              <a:rPr lang="en-US" sz="1400" dirty="0" err="1"/>
+              <a:t>InRoomDinning</a:t>
+            </a:r>
+            <a:r>
+              <a:rPr lang="en-US" sz="1400" dirty="0"/>
+              <a:t> checks </a:t>
+            </a:r>
+            <a:r>
+              <a:rPr lang="en-US" sz="1400" dirty="0" err="1"/>
+              <a:t>MiniBar</a:t>
+            </a:r>
+            <a:r>
+              <a:rPr lang="en-US" sz="1400" dirty="0"/>
+              <a:t> in Room. </a:t>
+            </a:r>
+          </a:p>
+          <a:p>
+            <a:pPr lvl="0"/>
+            <a:r>
+              <a:rPr lang="en-US" sz="1400" dirty="0" err="1"/>
+              <a:t>InRoomDinning</a:t>
+            </a:r>
+            <a:r>
+              <a:rPr lang="en-US" sz="1400" dirty="0"/>
+              <a:t> marks </a:t>
+            </a:r>
+            <a:r>
+              <a:rPr lang="en-US" sz="1400" dirty="0" err="1"/>
+              <a:t>MiniBar</a:t>
+            </a:r>
+            <a:r>
+              <a:rPr lang="en-US" sz="1400" dirty="0"/>
+              <a:t> Not Restocked (MBNR) in System once Patron leaves Room.</a:t>
+            </a:r>
+          </a:p>
+          <a:p>
+            <a:r>
+              <a:rPr lang="en-US" sz="1400" b="1" dirty="0"/>
+              <a:t>Extensions (Alternative Flow):</a:t>
+            </a:r>
+            <a:endParaRPr lang="en-US" sz="1400" dirty="0"/>
+          </a:p>
+          <a:p>
+            <a:r>
+              <a:rPr lang="en-US" sz="1400" dirty="0"/>
+              <a:t>	</a:t>
+            </a:r>
+            <a:r>
+              <a:rPr lang="en-US" sz="1400" dirty="0" smtClean="0"/>
+              <a:t> </a:t>
+            </a:r>
+            <a:r>
+              <a:rPr lang="en-US" sz="1400" dirty="0"/>
+              <a:t>Patron does not leave the Room so that Room is still Occupied (OC).</a:t>
+            </a:r>
+          </a:p>
+          <a:p>
+            <a:endParaRPr lang="en-US" sz="1400" dirty="0"/>
           </a:p>
         </p:txBody>
       </p:sp>
     </p:spTree>
     <p:extLst>
       <p:ext uri="{BB962C8B-B14F-4D97-AF65-F5344CB8AC3E}">
-        <p14:creationId xmlns:p14="http://schemas.microsoft.com/office/powerpoint/2010/main" val="596726536"/>
+        <p14:creationId xmlns:p14="http://schemas.microsoft.com/office/powerpoint/2010/main" val="4216272235"/>
       </p:ext>
     </p:extLst>
   </p:cSld>
@@ -4358,90 +5154,119 @@
       </p:grpSpPr>
       <p:sp>
         <p:nvSpPr>
-          <p:cNvPr id="2" name="Title 1">
+          <p:cNvPr id="2" name="Title 1"/>
+          <p:cNvSpPr>
+            <a:spLocks noGrp="1"/>
+          </p:cNvSpPr>
+          <p:nvPr>
+            <p:ph type="title"/>
+          </p:nvPr>
+        </p:nvSpPr>
+        <p:spPr>
+          <a:xfrm>
+            <a:off x="1513693" y="280461"/>
+            <a:ext cx="9607661" cy="1056319"/>
+          </a:xfrm>
+        </p:spPr>
+        <p:txBody>
+          <a:bodyPr>
+            <a:normAutofit/>
+          </a:bodyPr>
+          <a:lstStyle/>
+          <a:p>
+            <a:pPr algn="ctr"/>
+            <a:r>
+              <a:rPr lang="en-US" b="1" dirty="0" smtClean="0">
+                <a:latin typeface="Calibri" panose="020F0502020204030204" pitchFamily="34" charset="0"/>
+                <a:cs typeface="Calibri" panose="020F0502020204030204" pitchFamily="34" charset="0"/>
+              </a:rPr>
+              <a:t>System sequence diagram</a:t>
+            </a:r>
+            <a:endParaRPr lang="en-US" b="1" dirty="0">
+              <a:latin typeface="Calibri" panose="020F0502020204030204" pitchFamily="34" charset="0"/>
+              <a:cs typeface="Calibri" panose="020F0502020204030204" pitchFamily="34" charset="0"/>
+            </a:endParaRPr>
+          </a:p>
+        </p:txBody>
+      </p:sp>
+      <p:pic>
+        <p:nvPicPr>
+          <p:cNvPr id="7" name="Content Placeholder 6"/>
+          <p:cNvPicPr>
+            <a:picLocks noGrp="1"/>
+          </p:cNvPicPr>
+          <p:nvPr>
+            <p:ph sz="half" idx="2"/>
+          </p:nvPr>
+        </p:nvPicPr>
+        <p:blipFill>
+          <a:blip r:embed="rId2">
             <a:extLst>
-              <a:ext uri="{FF2B5EF4-FFF2-40B4-BE49-F238E27FC236}">
-                <a16:creationId xmlns:a16="http://schemas.microsoft.com/office/drawing/2014/main" id="{63BD7513-DDA3-469E-844C-EC72C8B3D232}"/>
+              <a:ext uri="{28A0092B-C50C-407E-A947-70E740481C1C}">
+                <a14:useLocalDpi xmlns:a14="http://schemas.microsoft.com/office/drawing/2010/main" val="0"/>
               </a:ext>
             </a:extLst>
-          </p:cNvPr>
-          <p:cNvSpPr>
-            <a:spLocks noGrp="1"/>
-          </p:cNvSpPr>
-          <p:nvPr>
-            <p:ph type="title"/>
-          </p:nvPr>
-        </p:nvSpPr>
-        <p:spPr/>
-        <p:txBody>
-          <a:bodyPr/>
-          <a:lstStyle/>
-          <a:p>
-            <a:pPr algn="ctr"/>
-            <a:r>
-              <a:rPr lang="en-US" b="1" dirty="0">
-                <a:latin typeface="Calibri" panose="020F0502020204030204" pitchFamily="34" charset="0"/>
-                <a:cs typeface="Calibri" panose="020F0502020204030204" pitchFamily="34" charset="0"/>
-              </a:rPr>
-              <a:t>Domain Class Diagram </a:t>
-            </a:r>
-          </a:p>
-        </p:txBody>
-      </p:sp>
-      <p:sp>
-        <p:nvSpPr>
-          <p:cNvPr id="3" name="Content Placeholder 2">
+          </a:blip>
+          <a:srcRect/>
+          <a:stretch>
+            <a:fillRect/>
+          </a:stretch>
+        </p:blipFill>
+        <p:spPr bwMode="auto">
+          <a:xfrm>
+            <a:off x="1447191" y="1928812"/>
+            <a:ext cx="4037507" cy="4172729"/>
+          </a:xfrm>
+          <a:prstGeom prst="rect">
+            <a:avLst/>
+          </a:prstGeom>
+          <a:noFill/>
+          <a:ln>
+            <a:noFill/>
+          </a:ln>
+        </p:spPr>
+      </p:pic>
+      <p:pic>
+        <p:nvPicPr>
+          <p:cNvPr id="8" name="Content Placeholder 7"/>
+          <p:cNvPicPr>
+            <a:picLocks noGrp="1"/>
+          </p:cNvPicPr>
+          <p:nvPr>
+            <p:ph sz="quarter" idx="4"/>
+          </p:nvPr>
+        </p:nvPicPr>
+        <p:blipFill>
+          <a:blip r:embed="rId3" cstate="print">
             <a:extLst>
-              <a:ext uri="{FF2B5EF4-FFF2-40B4-BE49-F238E27FC236}">
-                <a16:creationId xmlns:a16="http://schemas.microsoft.com/office/drawing/2014/main" id="{16C7F4E0-8748-4F2E-AD23-75695D75295A}"/>
+              <a:ext uri="{28A0092B-C50C-407E-A947-70E740481C1C}">
+                <a14:useLocalDpi xmlns:a14="http://schemas.microsoft.com/office/drawing/2010/main" val="0"/>
               </a:ext>
             </a:extLst>
-          </p:cNvPr>
-          <p:cNvSpPr>
-            <a:spLocks noGrp="1"/>
-          </p:cNvSpPr>
-          <p:nvPr>
-            <p:ph sz="half" idx="1"/>
-          </p:nvPr>
-        </p:nvSpPr>
-        <p:spPr/>
-        <p:txBody>
-          <a:bodyPr/>
-          <a:lstStyle/>
-          <a:p>
-            <a:endParaRPr lang="en-US"/>
-          </a:p>
-        </p:txBody>
-      </p:sp>
-      <p:sp>
-        <p:nvSpPr>
-          <p:cNvPr id="4" name="Content Placeholder 3">
-            <a:extLst>
-              <a:ext uri="{FF2B5EF4-FFF2-40B4-BE49-F238E27FC236}">
-                <a16:creationId xmlns:a16="http://schemas.microsoft.com/office/drawing/2014/main" id="{879B8089-5410-4BF8-99ED-780577B322B8}"/>
-              </a:ext>
-            </a:extLst>
-          </p:cNvPr>
-          <p:cNvSpPr>
-            <a:spLocks noGrp="1"/>
-          </p:cNvSpPr>
-          <p:nvPr>
-            <p:ph sz="half" idx="2"/>
-          </p:nvPr>
-        </p:nvSpPr>
-        <p:spPr/>
-        <p:txBody>
-          <a:bodyPr/>
-          <a:lstStyle/>
-          <a:p>
-            <a:endParaRPr lang="en-US"/>
-          </a:p>
-        </p:txBody>
-      </p:sp>
+          </a:blip>
+          <a:srcRect/>
+          <a:stretch>
+            <a:fillRect/>
+          </a:stretch>
+        </p:blipFill>
+        <p:spPr bwMode="auto">
+          <a:xfrm>
+            <a:off x="6591993" y="1877108"/>
+            <a:ext cx="4462859" cy="4241059"/>
+          </a:xfrm>
+          <a:prstGeom prst="rect">
+            <a:avLst/>
+          </a:prstGeom>
+          <a:noFill/>
+          <a:ln>
+            <a:noFill/>
+          </a:ln>
+        </p:spPr>
+      </p:pic>
     </p:spTree>
     <p:extLst>
       <p:ext uri="{BB962C8B-B14F-4D97-AF65-F5344CB8AC3E}">
-        <p14:creationId xmlns:p14="http://schemas.microsoft.com/office/powerpoint/2010/main" val="4255083623"/>
+        <p14:creationId xmlns:p14="http://schemas.microsoft.com/office/powerpoint/2010/main" val="4115796014"/>
       </p:ext>
     </p:extLst>
   </p:cSld>
@@ -4470,13 +5295,7 @@
       </p:grpSpPr>
       <p:sp>
         <p:nvSpPr>
-          <p:cNvPr id="2" name="Title 1">
-            <a:extLst>
-              <a:ext uri="{FF2B5EF4-FFF2-40B4-BE49-F238E27FC236}">
-                <a16:creationId xmlns:a16="http://schemas.microsoft.com/office/drawing/2014/main" id="{2A861907-2B50-47B1-BC16-BA9802B83033}"/>
-              </a:ext>
-            </a:extLst>
-          </p:cNvPr>
+          <p:cNvPr id="2" name="Title 1"/>
           <p:cNvSpPr>
             <a:spLocks noGrp="1"/>
           </p:cNvSpPr>
@@ -4484,52 +5303,63 @@
             <p:ph type="title"/>
           </p:nvPr>
         </p:nvSpPr>
-        <p:spPr/>
-        <p:txBody>
-          <a:bodyPr/>
+        <p:spPr>
+          <a:xfrm>
+            <a:off x="1512916" y="413821"/>
+            <a:ext cx="9603275" cy="1049235"/>
+          </a:xfrm>
+        </p:spPr>
+        <p:txBody>
+          <a:bodyPr>
+            <a:normAutofit/>
+          </a:bodyPr>
           <a:lstStyle/>
           <a:p>
             <a:pPr algn="ctr"/>
             <a:r>
-              <a:rPr lang="en-US" b="1" dirty="0">
-                <a:latin typeface="Calibri" panose="020F0502020204030204" pitchFamily="34" charset="0"/>
-                <a:cs typeface="Calibri" panose="020F0502020204030204" pitchFamily="34" charset="0"/>
-              </a:rPr>
-              <a:t>Reverse engineered Class Diagram</a:t>
-            </a:r>
-            <a:endParaRPr lang="en-US" dirty="0"/>
-          </a:p>
-        </p:txBody>
-      </p:sp>
-      <p:sp>
-        <p:nvSpPr>
-          <p:cNvPr id="3" name="Content Placeholder 2">
-            <a:extLst>
-              <a:ext uri="{FF2B5EF4-FFF2-40B4-BE49-F238E27FC236}">
-                <a16:creationId xmlns:a16="http://schemas.microsoft.com/office/drawing/2014/main" id="{D8992F48-4428-46AF-BA35-1C409BD427C4}"/>
-              </a:ext>
-            </a:extLst>
-          </p:cNvPr>
-          <p:cNvSpPr>
-            <a:spLocks noGrp="1"/>
-          </p:cNvSpPr>
+              <a:rPr lang="en-US" sz="2800" b="1" dirty="0" smtClean="0">
+                <a:latin typeface="Calibri" panose="020F0502020204030204" pitchFamily="34" charset="0"/>
+                <a:cs typeface="Calibri" panose="020F0502020204030204" pitchFamily="34" charset="0"/>
+              </a:rPr>
+              <a:t>Domain class diagram</a:t>
+            </a:r>
+            <a:endParaRPr lang="en-US" sz="2800" b="1" dirty="0">
+              <a:latin typeface="Calibri" panose="020F0502020204030204" pitchFamily="34" charset="0"/>
+              <a:cs typeface="Calibri" panose="020F0502020204030204" pitchFamily="34" charset="0"/>
+            </a:endParaRPr>
+          </a:p>
+        </p:txBody>
+      </p:sp>
+      <p:pic>
+        <p:nvPicPr>
+          <p:cNvPr id="4" name="Content Placeholder 3"/>
+          <p:cNvPicPr>
+            <a:picLocks noGrp="1" noChangeAspect="1"/>
+          </p:cNvPicPr>
           <p:nvPr>
             <p:ph idx="1"/>
           </p:nvPr>
-        </p:nvSpPr>
-        <p:spPr/>
-        <p:txBody>
-          <a:bodyPr/>
-          <a:lstStyle/>
-          <a:p>
-            <a:endParaRPr lang="en-US"/>
-          </a:p>
-        </p:txBody>
-      </p:sp>
+        </p:nvPicPr>
+        <p:blipFill>
+          <a:blip r:embed="rId2"/>
+          <a:stretch>
+            <a:fillRect/>
+          </a:stretch>
+        </p:blipFill>
+        <p:spPr>
+          <a:xfrm>
+            <a:off x="1429790" y="1853754"/>
+            <a:ext cx="9686401" cy="4222849"/>
+          </a:xfrm>
+          <a:prstGeom prst="rect">
+            <a:avLst/>
+          </a:prstGeom>
+        </p:spPr>
+      </p:pic>
     </p:spTree>
     <p:extLst>
       <p:ext uri="{BB962C8B-B14F-4D97-AF65-F5344CB8AC3E}">
-        <p14:creationId xmlns:p14="http://schemas.microsoft.com/office/powerpoint/2010/main" val="3253085804"/>
+        <p14:creationId xmlns:p14="http://schemas.microsoft.com/office/powerpoint/2010/main" val="1837830160"/>
       </p:ext>
     </p:extLst>
   </p:cSld>
@@ -4561,7 +5391,7 @@
           <p:cNvPr id="2" name="Title 1">
             <a:extLst>
               <a:ext uri="{FF2B5EF4-FFF2-40B4-BE49-F238E27FC236}">
-                <a16:creationId xmlns:a16="http://schemas.microsoft.com/office/drawing/2014/main" id="{5B3D2A5C-0963-44CD-AC29-80949461B143}"/>
+                <a16:creationId xmlns:a16="http://schemas.microsoft.com/office/drawing/2014/main" id="{2A861907-2B50-47B1-BC16-BA9802B83033}"/>
               </a:ext>
             </a:extLst>
           </p:cNvPr>
@@ -4583,8 +5413,9 @@
                 <a:latin typeface="Calibri" panose="020F0502020204030204" pitchFamily="34" charset="0"/>
                 <a:cs typeface="Calibri" panose="020F0502020204030204" pitchFamily="34" charset="0"/>
               </a:rPr>
-              <a:t>One code smell</a:t>
-            </a:r>
+              <a:t>Reverse engineered Class Diagram</a:t>
+            </a:r>
+            <a:endParaRPr lang="en-US" dirty="0"/>
           </a:p>
         </p:txBody>
       </p:sp>
@@ -4593,7 +5424,7 @@
           <p:cNvPr id="3" name="Content Placeholder 2">
             <a:extLst>
               <a:ext uri="{FF2B5EF4-FFF2-40B4-BE49-F238E27FC236}">
-                <a16:creationId xmlns:a16="http://schemas.microsoft.com/office/drawing/2014/main" id="{ED6468B1-FE05-4AD6-8D35-CE389B5A0BBA}"/>
+                <a16:creationId xmlns:a16="http://schemas.microsoft.com/office/drawing/2014/main" id="{D8992F48-4428-46AF-BA35-1C409BD427C4}"/>
               </a:ext>
             </a:extLst>
           </p:cNvPr>
@@ -4601,7 +5432,7 @@
             <a:spLocks noGrp="1"/>
           </p:cNvSpPr>
           <p:nvPr>
-            <p:ph sz="half" idx="1"/>
+            <p:ph idx="1"/>
           </p:nvPr>
         </p:nvSpPr>
         <p:spPr/>
@@ -4609,45 +5440,14 @@
           <a:bodyPr/>
           <a:lstStyle/>
           <a:p>
-            <a:r>
-              <a:rPr lang="en-US" dirty="0"/>
-              <a:t>Before</a:t>
-            </a:r>
-          </a:p>
-        </p:txBody>
-      </p:sp>
-      <p:sp>
-        <p:nvSpPr>
-          <p:cNvPr id="4" name="Content Placeholder 3">
-            <a:extLst>
-              <a:ext uri="{FF2B5EF4-FFF2-40B4-BE49-F238E27FC236}">
-                <a16:creationId xmlns:a16="http://schemas.microsoft.com/office/drawing/2014/main" id="{E3085887-AACC-4A91-A5C6-BAEC652F5D29}"/>
-              </a:ext>
-            </a:extLst>
-          </p:cNvPr>
-          <p:cNvSpPr>
-            <a:spLocks noGrp="1"/>
-          </p:cNvSpPr>
-          <p:nvPr>
-            <p:ph sz="half" idx="2"/>
-          </p:nvPr>
-        </p:nvSpPr>
-        <p:spPr/>
-        <p:txBody>
-          <a:bodyPr/>
-          <a:lstStyle/>
-          <a:p>
-            <a:r>
-              <a:rPr lang="en-US" dirty="0"/>
-              <a:t>After</a:t>
-            </a:r>
+            <a:endParaRPr lang="en-US"/>
           </a:p>
         </p:txBody>
       </p:sp>
     </p:spTree>
     <p:extLst>
       <p:ext uri="{BB962C8B-B14F-4D97-AF65-F5344CB8AC3E}">
-        <p14:creationId xmlns:p14="http://schemas.microsoft.com/office/powerpoint/2010/main" val="3385180618"/>
+        <p14:creationId xmlns:p14="http://schemas.microsoft.com/office/powerpoint/2010/main" val="3253085804"/>
       </p:ext>
     </p:extLst>
   </p:cSld>

</xml_diff>

<commit_message>
Corrected a few spelling mistakes
</commit_message>
<xml_diff>
--- a/Final_Presentation.pptx
+++ b/Final_Presentation.pptx
@@ -4365,7 +4365,21 @@
                 <a:latin typeface="Calibri" panose="020F0502020204030204" pitchFamily="34" charset="0"/>
                 <a:cs typeface="Calibri" panose="020F0502020204030204" pitchFamily="34" charset="0"/>
               </a:rPr>
-              <a:t>will check minibar in room and enters minibar status in system as well. </a:t>
+              <a:t>will check minibar in room and </a:t>
+            </a:r>
+            <a:r>
+              <a:rPr lang="en-US" sz="2400" dirty="0" smtClean="0">
+                <a:latin typeface="Calibri" panose="020F0502020204030204" pitchFamily="34" charset="0"/>
+                <a:cs typeface="Calibri" panose="020F0502020204030204" pitchFamily="34" charset="0"/>
+              </a:rPr>
+              <a:t>enter </a:t>
+            </a:r>
+            <a:r>
+              <a:rPr lang="en-US" sz="2400" dirty="0">
+                <a:latin typeface="Calibri" panose="020F0502020204030204" pitchFamily="34" charset="0"/>
+                <a:cs typeface="Calibri" panose="020F0502020204030204" pitchFamily="34" charset="0"/>
+              </a:rPr>
+              <a:t>minibar status in system as well. </a:t>
             </a:r>
             <a:endParaRPr lang="en-US" sz="2400" dirty="0" smtClean="0">
               <a:latin typeface="Calibri" panose="020F0502020204030204" pitchFamily="34" charset="0"/>
@@ -4463,7 +4477,7 @@
         </p:spPr>
         <p:txBody>
           <a:bodyPr>
-            <a:normAutofit lnSpcReduction="10000"/>
+            <a:normAutofit/>
           </a:bodyPr>
           <a:lstStyle/>
           <a:p>
@@ -4472,7 +4486,21 @@
                 <a:latin typeface="Calibri" panose="020F0502020204030204" pitchFamily="34" charset="0"/>
                 <a:cs typeface="Calibri" panose="020F0502020204030204" pitchFamily="34" charset="0"/>
               </a:rPr>
-              <a:t>Once rooms are clean and minibar restocked, </a:t>
+              <a:t>Once rooms are </a:t>
+            </a:r>
+            <a:r>
+              <a:rPr lang="en-US" sz="2400" dirty="0" smtClean="0">
+                <a:latin typeface="Calibri" panose="020F0502020204030204" pitchFamily="34" charset="0"/>
+                <a:cs typeface="Calibri" panose="020F0502020204030204" pitchFamily="34" charset="0"/>
+              </a:rPr>
+              <a:t>cleaned </a:t>
+            </a:r>
+            <a:r>
+              <a:rPr lang="en-US" sz="2400" dirty="0">
+                <a:latin typeface="Calibri" panose="020F0502020204030204" pitchFamily="34" charset="0"/>
+                <a:cs typeface="Calibri" panose="020F0502020204030204" pitchFamily="34" charset="0"/>
+              </a:rPr>
+              <a:t>and minibar restocked, </a:t>
             </a:r>
             <a:r>
               <a:rPr lang="en-US" sz="2400" dirty="0" err="1">
@@ -4532,7 +4560,21 @@
                 <a:latin typeface="Calibri" panose="020F0502020204030204" pitchFamily="34" charset="0"/>
                 <a:cs typeface="Calibri" panose="020F0502020204030204" pitchFamily="34" charset="0"/>
               </a:rPr>
-              <a:t>There is also interface so that each of the users &lt;&lt;Patron&gt;&gt; &lt;&lt;</a:t>
+              <a:t>There is also </a:t>
+            </a:r>
+            <a:r>
+              <a:rPr lang="en-US" sz="2400" dirty="0" smtClean="0">
+                <a:latin typeface="Calibri" panose="020F0502020204030204" pitchFamily="34" charset="0"/>
+                <a:cs typeface="Calibri" panose="020F0502020204030204" pitchFamily="34" charset="0"/>
+              </a:rPr>
+              <a:t>an interface allowing users </a:t>
+            </a:r>
+            <a:r>
+              <a:rPr lang="en-US" sz="2400" dirty="0">
+                <a:latin typeface="Calibri" panose="020F0502020204030204" pitchFamily="34" charset="0"/>
+                <a:cs typeface="Calibri" panose="020F0502020204030204" pitchFamily="34" charset="0"/>
+              </a:rPr>
+              <a:t>&lt;&lt;Patron&gt;&gt; &lt;&lt;</a:t>
             </a:r>
             <a:r>
               <a:rPr lang="en-US" sz="2400" dirty="0" err="1">
@@ -4560,24 +4602,29 @@
                 <a:latin typeface="Calibri" panose="020F0502020204030204" pitchFamily="34" charset="0"/>
                 <a:cs typeface="Calibri" panose="020F0502020204030204" pitchFamily="34" charset="0"/>
               </a:rPr>
-              <a:t>&gt;&gt;and &lt;&lt;housekeeping&gt;&gt; may interact with each other </a:t>
+              <a:t>&gt;&gt;and &lt;&lt;housekeeping&gt;&gt; </a:t>
             </a:r>
             <a:r>
               <a:rPr lang="en-US" sz="2400" dirty="0" smtClean="0">
                 <a:latin typeface="Calibri" panose="020F0502020204030204" pitchFamily="34" charset="0"/>
                 <a:cs typeface="Calibri" panose="020F0502020204030204" pitchFamily="34" charset="0"/>
               </a:rPr>
-              <a:t>via the </a:t>
+              <a:t>to </a:t>
             </a:r>
             <a:r>
               <a:rPr lang="en-US" sz="2400" dirty="0">
                 <a:latin typeface="Calibri" panose="020F0502020204030204" pitchFamily="34" charset="0"/>
                 <a:cs typeface="Calibri" panose="020F0502020204030204" pitchFamily="34" charset="0"/>
               </a:rPr>
-              <a:t>system as well</a:t>
-            </a:r>
-          </a:p>
-          <a:p>
+              <a:t>interact with each </a:t>
+            </a:r>
+            <a:r>
+              <a:rPr lang="en-US" sz="2400" dirty="0" smtClean="0">
+                <a:latin typeface="Calibri" panose="020F0502020204030204" pitchFamily="34" charset="0"/>
+                <a:cs typeface="Calibri" panose="020F0502020204030204" pitchFamily="34" charset="0"/>
+              </a:rPr>
+              <a:t>other</a:t>
+            </a:r>
             <a:endParaRPr lang="en-US" dirty="0"/>
           </a:p>
         </p:txBody>

</xml_diff>